<commit_message>
Releasing lec 24 slides
</commit_message>
<xml_diff>
--- a/tyler/meena/cs220/s21/materials/lec_24_S21.pptx
+++ b/tyler/meena/cs220/s21/materials/lec_24_S21.pptx
@@ -2165,7 +2165,7 @@
           </a:ln>
           <a:extLst>
             <a:ext uri="{C572A759-6A51-4108-AA02-DFA0A04FC94B}">
-              <ma14:wrappingTextBoxFlag xmlns:ma14="http://schemas.microsoft.com/office/mac/drawingml/2011/main" xmlns:a14="http://schemas.microsoft.com/office/drawing/2010/main" xmlns:m="http://schemas.openxmlformats.org/officeDocument/2006/math" xmlns="" val="1"/>
+              <ma14:wrappingTextBoxFlag xmlns="" xmlns:m="http://schemas.openxmlformats.org/officeDocument/2006/math" xmlns:a14="http://schemas.microsoft.com/office/drawing/2010/main" xmlns:ma14="http://schemas.microsoft.com/office/mac/drawingml/2011/main" val="1"/>
             </a:ext>
           </a:extLst>
         </p:spPr>
@@ -2204,7 +2204,7 @@
           </a:ln>
           <a:extLst>
             <a:ext uri="{C572A759-6A51-4108-AA02-DFA0A04FC94B}">
-              <ma14:wrappingTextBoxFlag xmlns:ma14="http://schemas.microsoft.com/office/mac/drawingml/2011/main" xmlns:a14="http://schemas.microsoft.com/office/drawing/2010/main" xmlns:m="http://schemas.openxmlformats.org/officeDocument/2006/math" xmlns="" val="1"/>
+              <ma14:wrappingTextBoxFlag xmlns="" xmlns:m="http://schemas.openxmlformats.org/officeDocument/2006/math" xmlns:a14="http://schemas.microsoft.com/office/drawing/2010/main" xmlns:ma14="http://schemas.microsoft.com/office/mac/drawingml/2011/main" val="1"/>
             </a:ext>
           </a:extLst>
         </p:spPr>
@@ -3419,7 +3419,7 @@
           </a:ln>
           <a:extLst>
             <a:ext uri="{C572A759-6A51-4108-AA02-DFA0A04FC94B}">
-              <ma14:wrappingTextBoxFlag xmlns:ma14="http://schemas.microsoft.com/office/mac/drawingml/2011/main" xmlns:a14="http://schemas.microsoft.com/office/drawing/2010/main" xmlns:m="http://schemas.openxmlformats.org/officeDocument/2006/math" xmlns="" val="1"/>
+              <ma14:wrappingTextBoxFlag xmlns="" xmlns:m="http://schemas.openxmlformats.org/officeDocument/2006/math" xmlns:a14="http://schemas.microsoft.com/office/drawing/2010/main" xmlns:ma14="http://schemas.microsoft.com/office/mac/drawingml/2011/main" val="1"/>
             </a:ext>
           </a:extLst>
         </p:spPr>
@@ -3454,7 +3454,7 @@
           </a:ln>
           <a:extLst>
             <a:ext uri="{C572A759-6A51-4108-AA02-DFA0A04FC94B}">
-              <ma14:wrappingTextBoxFlag xmlns:ma14="http://schemas.microsoft.com/office/mac/drawingml/2011/main" xmlns:a14="http://schemas.microsoft.com/office/drawing/2010/main" xmlns:m="http://schemas.openxmlformats.org/officeDocument/2006/math" xmlns="" val="1"/>
+              <ma14:wrappingTextBoxFlag xmlns="" xmlns:m="http://schemas.openxmlformats.org/officeDocument/2006/math" xmlns:a14="http://schemas.microsoft.com/office/drawing/2010/main" xmlns:ma14="http://schemas.microsoft.com/office/mac/drawingml/2011/main" val="1"/>
             </a:ext>
           </a:extLst>
         </p:spPr>
@@ -3501,7 +3501,7 @@
           </a:ln>
           <a:extLst>
             <a:ext uri="{C572A759-6A51-4108-AA02-DFA0A04FC94B}">
-              <ma14:wrappingTextBoxFlag xmlns:ma14="http://schemas.microsoft.com/office/mac/drawingml/2011/main" xmlns:a14="http://schemas.microsoft.com/office/drawing/2010/main" xmlns:m="http://schemas.openxmlformats.org/officeDocument/2006/math" xmlns="" val="1"/>
+              <ma14:wrappingTextBoxFlag xmlns="" xmlns:m="http://schemas.openxmlformats.org/officeDocument/2006/math" xmlns:a14="http://schemas.microsoft.com/office/drawing/2010/main" xmlns:ma14="http://schemas.microsoft.com/office/mac/drawingml/2011/main" val="1"/>
             </a:ext>
           </a:extLst>
         </p:spPr>
@@ -3548,7 +3548,7 @@
           </a:ln>
           <a:extLst>
             <a:ext uri="{C572A759-6A51-4108-AA02-DFA0A04FC94B}">
-              <ma14:wrappingTextBoxFlag xmlns:ma14="http://schemas.microsoft.com/office/mac/drawingml/2011/main" xmlns:a14="http://schemas.microsoft.com/office/drawing/2010/main" xmlns:m="http://schemas.openxmlformats.org/officeDocument/2006/math" xmlns="" val="1"/>
+              <ma14:wrappingTextBoxFlag xmlns="" xmlns:m="http://schemas.openxmlformats.org/officeDocument/2006/math" xmlns:a14="http://schemas.microsoft.com/office/drawing/2010/main" xmlns:ma14="http://schemas.microsoft.com/office/mac/drawingml/2011/main" val="1"/>
             </a:ext>
           </a:extLst>
         </p:spPr>
@@ -3936,7 +3936,7 @@
           </a:ln>
           <a:extLst>
             <a:ext uri="{C572A759-6A51-4108-AA02-DFA0A04FC94B}">
-              <ma14:wrappingTextBoxFlag xmlns:ma14="http://schemas.microsoft.com/office/mac/drawingml/2011/main" xmlns:a14="http://schemas.microsoft.com/office/drawing/2010/main" xmlns:m="http://schemas.openxmlformats.org/officeDocument/2006/math" xmlns="" val="1"/>
+              <ma14:wrappingTextBoxFlag xmlns="" xmlns:m="http://schemas.openxmlformats.org/officeDocument/2006/math" xmlns:a14="http://schemas.microsoft.com/office/drawing/2010/main" xmlns:ma14="http://schemas.microsoft.com/office/mac/drawingml/2011/main" val="1"/>
             </a:ext>
           </a:extLst>
         </p:spPr>
@@ -3982,7 +3982,7 @@
           </a:ln>
           <a:extLst>
             <a:ext uri="{C572A759-6A51-4108-AA02-DFA0A04FC94B}">
-              <ma14:wrappingTextBoxFlag xmlns:ma14="http://schemas.microsoft.com/office/mac/drawingml/2011/main" xmlns:a14="http://schemas.microsoft.com/office/drawing/2010/main" xmlns:m="http://schemas.openxmlformats.org/officeDocument/2006/math" xmlns="" val="1"/>
+              <ma14:wrappingTextBoxFlag xmlns="" xmlns:m="http://schemas.openxmlformats.org/officeDocument/2006/math" xmlns:a14="http://schemas.microsoft.com/office/drawing/2010/main" xmlns:ma14="http://schemas.microsoft.com/office/mac/drawingml/2011/main" val="1"/>
             </a:ext>
           </a:extLst>
         </p:spPr>
@@ -4028,7 +4028,7 @@
           </a:ln>
           <a:extLst>
             <a:ext uri="{C572A759-6A51-4108-AA02-DFA0A04FC94B}">
-              <ma14:wrappingTextBoxFlag xmlns:ma14="http://schemas.microsoft.com/office/mac/drawingml/2011/main" xmlns:a14="http://schemas.microsoft.com/office/drawing/2010/main" xmlns:m="http://schemas.openxmlformats.org/officeDocument/2006/math" xmlns="" val="1"/>
+              <ma14:wrappingTextBoxFlag xmlns="" xmlns:m="http://schemas.openxmlformats.org/officeDocument/2006/math" xmlns:a14="http://schemas.microsoft.com/office/drawing/2010/main" xmlns:ma14="http://schemas.microsoft.com/office/mac/drawingml/2011/main" val="1"/>
             </a:ext>
           </a:extLst>
         </p:spPr>
@@ -4100,7 +4100,7 @@
           </a:ln>
           <a:extLst>
             <a:ext uri="{C572A759-6A51-4108-AA02-DFA0A04FC94B}">
-              <ma14:wrappingTextBoxFlag xmlns:ma14="http://schemas.microsoft.com/office/mac/drawingml/2011/main" xmlns:a14="http://schemas.microsoft.com/office/drawing/2010/main" xmlns:m="http://schemas.openxmlformats.org/officeDocument/2006/math" xmlns="" val="1"/>
+              <ma14:wrappingTextBoxFlag xmlns="" xmlns:m="http://schemas.openxmlformats.org/officeDocument/2006/math" xmlns:a14="http://schemas.microsoft.com/office/drawing/2010/main" xmlns:ma14="http://schemas.microsoft.com/office/mac/drawingml/2011/main" val="1"/>
             </a:ext>
           </a:extLst>
         </p:spPr>
@@ -4218,7 +4218,7 @@
           </a:ln>
           <a:extLst>
             <a:ext uri="{C572A759-6A51-4108-AA02-DFA0A04FC94B}">
-              <ma14:wrappingTextBoxFlag xmlns:ma14="http://schemas.microsoft.com/office/mac/drawingml/2011/main" xmlns:a14="http://schemas.microsoft.com/office/drawing/2010/main" xmlns:m="http://schemas.openxmlformats.org/officeDocument/2006/math" xmlns="" val="1"/>
+              <ma14:wrappingTextBoxFlag xmlns="" xmlns:m="http://schemas.openxmlformats.org/officeDocument/2006/math" xmlns:a14="http://schemas.microsoft.com/office/drawing/2010/main" xmlns:ma14="http://schemas.microsoft.com/office/mac/drawingml/2011/main" val="1"/>
             </a:ext>
           </a:extLst>
         </p:spPr>
@@ -4263,7 +4263,7 @@
           </a:ln>
           <a:extLst>
             <a:ext uri="{C572A759-6A51-4108-AA02-DFA0A04FC94B}">
-              <ma14:wrappingTextBoxFlag xmlns:ma14="http://schemas.microsoft.com/office/mac/drawingml/2011/main" xmlns:a14="http://schemas.microsoft.com/office/drawing/2010/main" xmlns:m="http://schemas.openxmlformats.org/officeDocument/2006/math" xmlns="" val="1"/>
+              <ma14:wrappingTextBoxFlag xmlns="" xmlns:m="http://schemas.openxmlformats.org/officeDocument/2006/math" xmlns:a14="http://schemas.microsoft.com/office/drawing/2010/main" xmlns:ma14="http://schemas.microsoft.com/office/mac/drawingml/2011/main" val="1"/>
             </a:ext>
           </a:extLst>
         </p:spPr>
@@ -4308,7 +4308,7 @@
           </a:ln>
           <a:extLst>
             <a:ext uri="{C572A759-6A51-4108-AA02-DFA0A04FC94B}">
-              <ma14:wrappingTextBoxFlag xmlns:ma14="http://schemas.microsoft.com/office/mac/drawingml/2011/main" xmlns:a14="http://schemas.microsoft.com/office/drawing/2010/main" xmlns:m="http://schemas.openxmlformats.org/officeDocument/2006/math" xmlns="" val="1"/>
+              <ma14:wrappingTextBoxFlag xmlns="" xmlns:m="http://schemas.openxmlformats.org/officeDocument/2006/math" xmlns:a14="http://schemas.microsoft.com/office/drawing/2010/main" xmlns:ma14="http://schemas.microsoft.com/office/mac/drawingml/2011/main" val="1"/>
             </a:ext>
           </a:extLst>
         </p:spPr>
@@ -4494,7 +4494,7 @@
           </a:ln>
           <a:extLst>
             <a:ext uri="{C572A759-6A51-4108-AA02-DFA0A04FC94B}">
-              <ma14:wrappingTextBoxFlag xmlns:ma14="http://schemas.microsoft.com/office/mac/drawingml/2011/main" xmlns:a14="http://schemas.microsoft.com/office/drawing/2010/main" xmlns:m="http://schemas.openxmlformats.org/officeDocument/2006/math" xmlns="" val="1"/>
+              <ma14:wrappingTextBoxFlag xmlns="" xmlns:m="http://schemas.openxmlformats.org/officeDocument/2006/math" xmlns:a14="http://schemas.microsoft.com/office/drawing/2010/main" xmlns:ma14="http://schemas.microsoft.com/office/mac/drawingml/2011/main" val="1"/>
             </a:ext>
           </a:extLst>
         </p:spPr>
@@ -4529,7 +4529,7 @@
           </a:ln>
           <a:extLst>
             <a:ext uri="{C572A759-6A51-4108-AA02-DFA0A04FC94B}">
-              <ma14:wrappingTextBoxFlag xmlns:ma14="http://schemas.microsoft.com/office/mac/drawingml/2011/main" xmlns:a14="http://schemas.microsoft.com/office/drawing/2010/main" xmlns:m="http://schemas.openxmlformats.org/officeDocument/2006/math" xmlns="" val="1"/>
+              <ma14:wrappingTextBoxFlag xmlns="" xmlns:m="http://schemas.openxmlformats.org/officeDocument/2006/math" xmlns:a14="http://schemas.microsoft.com/office/drawing/2010/main" xmlns:ma14="http://schemas.microsoft.com/office/mac/drawingml/2011/main" val="1"/>
             </a:ext>
           </a:extLst>
         </p:spPr>
@@ -4576,7 +4576,7 @@
           </a:ln>
           <a:extLst>
             <a:ext uri="{C572A759-6A51-4108-AA02-DFA0A04FC94B}">
-              <ma14:wrappingTextBoxFlag xmlns:ma14="http://schemas.microsoft.com/office/mac/drawingml/2011/main" xmlns:a14="http://schemas.microsoft.com/office/drawing/2010/main" xmlns:m="http://schemas.openxmlformats.org/officeDocument/2006/math" xmlns="" val="1"/>
+              <ma14:wrappingTextBoxFlag xmlns="" xmlns:m="http://schemas.openxmlformats.org/officeDocument/2006/math" xmlns:a14="http://schemas.microsoft.com/office/drawing/2010/main" xmlns:ma14="http://schemas.microsoft.com/office/mac/drawingml/2011/main" val="1"/>
             </a:ext>
           </a:extLst>
         </p:spPr>
@@ -4623,7 +4623,7 @@
           </a:ln>
           <a:extLst>
             <a:ext uri="{C572A759-6A51-4108-AA02-DFA0A04FC94B}">
-              <ma14:wrappingTextBoxFlag xmlns:ma14="http://schemas.microsoft.com/office/mac/drawingml/2011/main" xmlns:a14="http://schemas.microsoft.com/office/drawing/2010/main" xmlns:m="http://schemas.openxmlformats.org/officeDocument/2006/math" xmlns="" val="1"/>
+              <ma14:wrappingTextBoxFlag xmlns="" xmlns:m="http://schemas.openxmlformats.org/officeDocument/2006/math" xmlns:a14="http://schemas.microsoft.com/office/drawing/2010/main" xmlns:ma14="http://schemas.microsoft.com/office/mac/drawingml/2011/main" val="1"/>
             </a:ext>
           </a:extLst>
         </p:spPr>
@@ -5011,7 +5011,7 @@
           </a:ln>
           <a:extLst>
             <a:ext uri="{C572A759-6A51-4108-AA02-DFA0A04FC94B}">
-              <ma14:wrappingTextBoxFlag xmlns:ma14="http://schemas.microsoft.com/office/mac/drawingml/2011/main" xmlns:a14="http://schemas.microsoft.com/office/drawing/2010/main" xmlns:m="http://schemas.openxmlformats.org/officeDocument/2006/math" xmlns="" val="1"/>
+              <ma14:wrappingTextBoxFlag xmlns="" xmlns:m="http://schemas.openxmlformats.org/officeDocument/2006/math" xmlns:a14="http://schemas.microsoft.com/office/drawing/2010/main" xmlns:ma14="http://schemas.microsoft.com/office/mac/drawingml/2011/main" val="1"/>
             </a:ext>
           </a:extLst>
         </p:spPr>
@@ -5057,7 +5057,7 @@
           </a:ln>
           <a:extLst>
             <a:ext uri="{C572A759-6A51-4108-AA02-DFA0A04FC94B}">
-              <ma14:wrappingTextBoxFlag xmlns:ma14="http://schemas.microsoft.com/office/mac/drawingml/2011/main" xmlns:a14="http://schemas.microsoft.com/office/drawing/2010/main" xmlns:m="http://schemas.openxmlformats.org/officeDocument/2006/math" xmlns="" val="1"/>
+              <ma14:wrappingTextBoxFlag xmlns="" xmlns:m="http://schemas.openxmlformats.org/officeDocument/2006/math" xmlns:a14="http://schemas.microsoft.com/office/drawing/2010/main" xmlns:ma14="http://schemas.microsoft.com/office/mac/drawingml/2011/main" val="1"/>
             </a:ext>
           </a:extLst>
         </p:spPr>
@@ -5103,7 +5103,7 @@
           </a:ln>
           <a:extLst>
             <a:ext uri="{C572A759-6A51-4108-AA02-DFA0A04FC94B}">
-              <ma14:wrappingTextBoxFlag xmlns:ma14="http://schemas.microsoft.com/office/mac/drawingml/2011/main" xmlns:a14="http://schemas.microsoft.com/office/drawing/2010/main" xmlns:m="http://schemas.openxmlformats.org/officeDocument/2006/math" xmlns="" val="1"/>
+              <ma14:wrappingTextBoxFlag xmlns="" xmlns:m="http://schemas.openxmlformats.org/officeDocument/2006/math" xmlns:a14="http://schemas.microsoft.com/office/drawing/2010/main" xmlns:ma14="http://schemas.microsoft.com/office/mac/drawingml/2011/main" val="1"/>
             </a:ext>
           </a:extLst>
         </p:spPr>
@@ -5149,7 +5149,7 @@
           </a:ln>
           <a:extLst>
             <a:ext uri="{C572A759-6A51-4108-AA02-DFA0A04FC94B}">
-              <ma14:wrappingTextBoxFlag xmlns:ma14="http://schemas.microsoft.com/office/mac/drawingml/2011/main" xmlns:a14="http://schemas.microsoft.com/office/drawing/2010/main" xmlns:m="http://schemas.openxmlformats.org/officeDocument/2006/math" xmlns="" val="1"/>
+              <ma14:wrappingTextBoxFlag xmlns="" xmlns:m="http://schemas.openxmlformats.org/officeDocument/2006/math" xmlns:a14="http://schemas.microsoft.com/office/drawing/2010/main" xmlns:ma14="http://schemas.microsoft.com/office/mac/drawingml/2011/main" val="1"/>
             </a:ext>
           </a:extLst>
         </p:spPr>
@@ -5221,7 +5221,7 @@
           </a:ln>
           <a:extLst>
             <a:ext uri="{C572A759-6A51-4108-AA02-DFA0A04FC94B}">
-              <ma14:wrappingTextBoxFlag xmlns:ma14="http://schemas.microsoft.com/office/mac/drawingml/2011/main" xmlns:a14="http://schemas.microsoft.com/office/drawing/2010/main" xmlns:m="http://schemas.openxmlformats.org/officeDocument/2006/math" xmlns="" val="1"/>
+              <ma14:wrappingTextBoxFlag xmlns="" xmlns:m="http://schemas.openxmlformats.org/officeDocument/2006/math" xmlns:a14="http://schemas.microsoft.com/office/drawing/2010/main" xmlns:ma14="http://schemas.microsoft.com/office/mac/drawingml/2011/main" val="1"/>
             </a:ext>
           </a:extLst>
         </p:spPr>
@@ -5293,7 +5293,7 @@
           </a:ln>
           <a:extLst>
             <a:ext uri="{C572A759-6A51-4108-AA02-DFA0A04FC94B}">
-              <ma14:wrappingTextBoxFlag xmlns:ma14="http://schemas.microsoft.com/office/mac/drawingml/2011/main" xmlns:a14="http://schemas.microsoft.com/office/drawing/2010/main" xmlns:m="http://schemas.openxmlformats.org/officeDocument/2006/math" xmlns="" val="1"/>
+              <ma14:wrappingTextBoxFlag xmlns="" xmlns:m="http://schemas.openxmlformats.org/officeDocument/2006/math" xmlns:a14="http://schemas.microsoft.com/office/drawing/2010/main" xmlns:ma14="http://schemas.microsoft.com/office/mac/drawingml/2011/main" val="1"/>
             </a:ext>
           </a:extLst>
         </p:spPr>
@@ -5413,7 +5413,7 @@
           </a:ln>
           <a:extLst>
             <a:ext uri="{C572A759-6A51-4108-AA02-DFA0A04FC94B}">
-              <ma14:wrappingTextBoxFlag xmlns:ma14="http://schemas.microsoft.com/office/mac/drawingml/2011/main" xmlns:a14="http://schemas.microsoft.com/office/drawing/2010/main" xmlns:m="http://schemas.openxmlformats.org/officeDocument/2006/math" xmlns="" val="1"/>
+              <ma14:wrappingTextBoxFlag xmlns="" xmlns:m="http://schemas.openxmlformats.org/officeDocument/2006/math" xmlns:a14="http://schemas.microsoft.com/office/drawing/2010/main" xmlns:ma14="http://schemas.microsoft.com/office/mac/drawingml/2011/main" val="1"/>
             </a:ext>
           </a:extLst>
         </p:spPr>
@@ -5461,7 +5461,7 @@
           </a:ln>
           <a:extLst>
             <a:ext uri="{C572A759-6A51-4108-AA02-DFA0A04FC94B}">
-              <ma14:wrappingTextBoxFlag xmlns:ma14="http://schemas.microsoft.com/office/mac/drawingml/2011/main" xmlns:a14="http://schemas.microsoft.com/office/drawing/2010/main" xmlns:m="http://schemas.openxmlformats.org/officeDocument/2006/math" xmlns="" val="1"/>
+              <ma14:wrappingTextBoxFlag xmlns="" xmlns:m="http://schemas.openxmlformats.org/officeDocument/2006/math" xmlns:a14="http://schemas.microsoft.com/office/drawing/2010/main" xmlns:ma14="http://schemas.microsoft.com/office/mac/drawingml/2011/main" val="1"/>
             </a:ext>
           </a:extLst>
         </p:spPr>
@@ -5506,7 +5506,7 @@
           </a:ln>
           <a:extLst>
             <a:ext uri="{C572A759-6A51-4108-AA02-DFA0A04FC94B}">
-              <ma14:wrappingTextBoxFlag xmlns:ma14="http://schemas.microsoft.com/office/mac/drawingml/2011/main" xmlns:a14="http://schemas.microsoft.com/office/drawing/2010/main" xmlns:m="http://schemas.openxmlformats.org/officeDocument/2006/math" xmlns="" val="1"/>
+              <ma14:wrappingTextBoxFlag xmlns="" xmlns:m="http://schemas.openxmlformats.org/officeDocument/2006/math" xmlns:a14="http://schemas.microsoft.com/office/drawing/2010/main" xmlns:ma14="http://schemas.microsoft.com/office/mac/drawingml/2011/main" val="1"/>
             </a:ext>
           </a:extLst>
         </p:spPr>
@@ -5551,7 +5551,7 @@
           </a:ln>
           <a:extLst>
             <a:ext uri="{C572A759-6A51-4108-AA02-DFA0A04FC94B}">
-              <ma14:wrappingTextBoxFlag xmlns:ma14="http://schemas.microsoft.com/office/mac/drawingml/2011/main" xmlns:a14="http://schemas.microsoft.com/office/drawing/2010/main" xmlns:m="http://schemas.openxmlformats.org/officeDocument/2006/math" xmlns="" val="1"/>
+              <ma14:wrappingTextBoxFlag xmlns="" xmlns:m="http://schemas.openxmlformats.org/officeDocument/2006/math" xmlns:a14="http://schemas.microsoft.com/office/drawing/2010/main" xmlns:ma14="http://schemas.microsoft.com/office/mac/drawingml/2011/main" val="1"/>
             </a:ext>
           </a:extLst>
         </p:spPr>
@@ -5796,7 +5796,7 @@
           </a:ln>
           <a:extLst>
             <a:ext uri="{C572A759-6A51-4108-AA02-DFA0A04FC94B}">
-              <ma14:wrappingTextBoxFlag xmlns:ma14="http://schemas.microsoft.com/office/mac/drawingml/2011/main" xmlns:a14="http://schemas.microsoft.com/office/drawing/2010/main" xmlns:m="http://schemas.openxmlformats.org/officeDocument/2006/math" xmlns="" val="1"/>
+              <ma14:wrappingTextBoxFlag xmlns="" xmlns:m="http://schemas.openxmlformats.org/officeDocument/2006/math" xmlns:a14="http://schemas.microsoft.com/office/drawing/2010/main" xmlns:ma14="http://schemas.microsoft.com/office/mac/drawingml/2011/main" val="1"/>
             </a:ext>
           </a:extLst>
         </p:spPr>
@@ -5831,7 +5831,7 @@
           </a:ln>
           <a:extLst>
             <a:ext uri="{C572A759-6A51-4108-AA02-DFA0A04FC94B}">
-              <ma14:wrappingTextBoxFlag xmlns:ma14="http://schemas.microsoft.com/office/mac/drawingml/2011/main" xmlns:a14="http://schemas.microsoft.com/office/drawing/2010/main" xmlns:m="http://schemas.openxmlformats.org/officeDocument/2006/math" xmlns="" val="1"/>
+              <ma14:wrappingTextBoxFlag xmlns="" xmlns:m="http://schemas.openxmlformats.org/officeDocument/2006/math" xmlns:a14="http://schemas.microsoft.com/office/drawing/2010/main" xmlns:ma14="http://schemas.microsoft.com/office/mac/drawingml/2011/main" val="1"/>
             </a:ext>
           </a:extLst>
         </p:spPr>
@@ -5878,7 +5878,7 @@
           </a:ln>
           <a:extLst>
             <a:ext uri="{C572A759-6A51-4108-AA02-DFA0A04FC94B}">
-              <ma14:wrappingTextBoxFlag xmlns:ma14="http://schemas.microsoft.com/office/mac/drawingml/2011/main" xmlns:a14="http://schemas.microsoft.com/office/drawing/2010/main" xmlns:m="http://schemas.openxmlformats.org/officeDocument/2006/math" xmlns="" val="1"/>
+              <ma14:wrappingTextBoxFlag xmlns="" xmlns:m="http://schemas.openxmlformats.org/officeDocument/2006/math" xmlns:a14="http://schemas.microsoft.com/office/drawing/2010/main" xmlns:ma14="http://schemas.microsoft.com/office/mac/drawingml/2011/main" val="1"/>
             </a:ext>
           </a:extLst>
         </p:spPr>
@@ -5925,7 +5925,7 @@
           </a:ln>
           <a:extLst>
             <a:ext uri="{C572A759-6A51-4108-AA02-DFA0A04FC94B}">
-              <ma14:wrappingTextBoxFlag xmlns:ma14="http://schemas.microsoft.com/office/mac/drawingml/2011/main" xmlns:a14="http://schemas.microsoft.com/office/drawing/2010/main" xmlns:m="http://schemas.openxmlformats.org/officeDocument/2006/math" xmlns="" val="1"/>
+              <ma14:wrappingTextBoxFlag xmlns="" xmlns:m="http://schemas.openxmlformats.org/officeDocument/2006/math" xmlns:a14="http://schemas.microsoft.com/office/drawing/2010/main" xmlns:ma14="http://schemas.microsoft.com/office/mac/drawingml/2011/main" val="1"/>
             </a:ext>
           </a:extLst>
         </p:spPr>
@@ -6313,7 +6313,7 @@
           </a:ln>
           <a:extLst>
             <a:ext uri="{C572A759-6A51-4108-AA02-DFA0A04FC94B}">
-              <ma14:wrappingTextBoxFlag xmlns:ma14="http://schemas.microsoft.com/office/mac/drawingml/2011/main" xmlns:a14="http://schemas.microsoft.com/office/drawing/2010/main" xmlns:m="http://schemas.openxmlformats.org/officeDocument/2006/math" xmlns="" val="1"/>
+              <ma14:wrappingTextBoxFlag xmlns="" xmlns:m="http://schemas.openxmlformats.org/officeDocument/2006/math" xmlns:a14="http://schemas.microsoft.com/office/drawing/2010/main" xmlns:ma14="http://schemas.microsoft.com/office/mac/drawingml/2011/main" val="1"/>
             </a:ext>
           </a:extLst>
         </p:spPr>
@@ -6359,7 +6359,7 @@
           </a:ln>
           <a:extLst>
             <a:ext uri="{C572A759-6A51-4108-AA02-DFA0A04FC94B}">
-              <ma14:wrappingTextBoxFlag xmlns:ma14="http://schemas.microsoft.com/office/mac/drawingml/2011/main" xmlns:a14="http://schemas.microsoft.com/office/drawing/2010/main" xmlns:m="http://schemas.openxmlformats.org/officeDocument/2006/math" xmlns="" val="1"/>
+              <ma14:wrappingTextBoxFlag xmlns="" xmlns:m="http://schemas.openxmlformats.org/officeDocument/2006/math" xmlns:a14="http://schemas.microsoft.com/office/drawing/2010/main" xmlns:ma14="http://schemas.microsoft.com/office/mac/drawingml/2011/main" val="1"/>
             </a:ext>
           </a:extLst>
         </p:spPr>
@@ -6405,7 +6405,7 @@
           </a:ln>
           <a:extLst>
             <a:ext uri="{C572A759-6A51-4108-AA02-DFA0A04FC94B}">
-              <ma14:wrappingTextBoxFlag xmlns:ma14="http://schemas.microsoft.com/office/mac/drawingml/2011/main" xmlns:a14="http://schemas.microsoft.com/office/drawing/2010/main" xmlns:m="http://schemas.openxmlformats.org/officeDocument/2006/math" xmlns="" val="1"/>
+              <ma14:wrappingTextBoxFlag xmlns="" xmlns:m="http://schemas.openxmlformats.org/officeDocument/2006/math" xmlns:a14="http://schemas.microsoft.com/office/drawing/2010/main" xmlns:ma14="http://schemas.microsoft.com/office/mac/drawingml/2011/main" val="1"/>
             </a:ext>
           </a:extLst>
         </p:spPr>
@@ -6451,7 +6451,7 @@
           </a:ln>
           <a:extLst>
             <a:ext uri="{C572A759-6A51-4108-AA02-DFA0A04FC94B}">
-              <ma14:wrappingTextBoxFlag xmlns:ma14="http://schemas.microsoft.com/office/mac/drawingml/2011/main" xmlns:a14="http://schemas.microsoft.com/office/drawing/2010/main" xmlns:m="http://schemas.openxmlformats.org/officeDocument/2006/math" xmlns="" val="1"/>
+              <ma14:wrappingTextBoxFlag xmlns="" xmlns:m="http://schemas.openxmlformats.org/officeDocument/2006/math" xmlns:a14="http://schemas.microsoft.com/office/drawing/2010/main" xmlns:ma14="http://schemas.microsoft.com/office/mac/drawingml/2011/main" val="1"/>
             </a:ext>
           </a:extLst>
         </p:spPr>
@@ -6523,7 +6523,7 @@
           </a:ln>
           <a:extLst>
             <a:ext uri="{C572A759-6A51-4108-AA02-DFA0A04FC94B}">
-              <ma14:wrappingTextBoxFlag xmlns:ma14="http://schemas.microsoft.com/office/mac/drawingml/2011/main" xmlns:a14="http://schemas.microsoft.com/office/drawing/2010/main" xmlns:m="http://schemas.openxmlformats.org/officeDocument/2006/math" xmlns="" val="1"/>
+              <ma14:wrappingTextBoxFlag xmlns="" xmlns:m="http://schemas.openxmlformats.org/officeDocument/2006/math" xmlns:a14="http://schemas.microsoft.com/office/drawing/2010/main" xmlns:ma14="http://schemas.microsoft.com/office/mac/drawingml/2011/main" val="1"/>
             </a:ext>
           </a:extLst>
         </p:spPr>
@@ -6595,7 +6595,7 @@
           </a:ln>
           <a:extLst>
             <a:ext uri="{C572A759-6A51-4108-AA02-DFA0A04FC94B}">
-              <ma14:wrappingTextBoxFlag xmlns:ma14="http://schemas.microsoft.com/office/mac/drawingml/2011/main" xmlns:a14="http://schemas.microsoft.com/office/drawing/2010/main" xmlns:m="http://schemas.openxmlformats.org/officeDocument/2006/math" xmlns="" val="1"/>
+              <ma14:wrappingTextBoxFlag xmlns="" xmlns:m="http://schemas.openxmlformats.org/officeDocument/2006/math" xmlns:a14="http://schemas.microsoft.com/office/drawing/2010/main" xmlns:ma14="http://schemas.microsoft.com/office/mac/drawingml/2011/main" val="1"/>
             </a:ext>
           </a:extLst>
         </p:spPr>
@@ -6715,7 +6715,7 @@
           </a:ln>
           <a:extLst>
             <a:ext uri="{C572A759-6A51-4108-AA02-DFA0A04FC94B}">
-              <ma14:wrappingTextBoxFlag xmlns:ma14="http://schemas.microsoft.com/office/mac/drawingml/2011/main" xmlns:a14="http://schemas.microsoft.com/office/drawing/2010/main" xmlns:m="http://schemas.openxmlformats.org/officeDocument/2006/math" xmlns="" val="1"/>
+              <ma14:wrappingTextBoxFlag xmlns="" xmlns:m="http://schemas.openxmlformats.org/officeDocument/2006/math" xmlns:a14="http://schemas.microsoft.com/office/drawing/2010/main" xmlns:ma14="http://schemas.microsoft.com/office/mac/drawingml/2011/main" val="1"/>
             </a:ext>
           </a:extLst>
         </p:spPr>
@@ -6763,7 +6763,7 @@
           </a:ln>
           <a:extLst>
             <a:ext uri="{C572A759-6A51-4108-AA02-DFA0A04FC94B}">
-              <ma14:wrappingTextBoxFlag xmlns:ma14="http://schemas.microsoft.com/office/mac/drawingml/2011/main" xmlns:a14="http://schemas.microsoft.com/office/drawing/2010/main" xmlns:m="http://schemas.openxmlformats.org/officeDocument/2006/math" xmlns="" val="1"/>
+              <ma14:wrappingTextBoxFlag xmlns="" xmlns:m="http://schemas.openxmlformats.org/officeDocument/2006/math" xmlns:a14="http://schemas.microsoft.com/office/drawing/2010/main" xmlns:ma14="http://schemas.microsoft.com/office/mac/drawingml/2011/main" val="1"/>
             </a:ext>
           </a:extLst>
         </p:spPr>
@@ -6808,7 +6808,7 @@
           </a:ln>
           <a:extLst>
             <a:ext uri="{C572A759-6A51-4108-AA02-DFA0A04FC94B}">
-              <ma14:wrappingTextBoxFlag xmlns:ma14="http://schemas.microsoft.com/office/mac/drawingml/2011/main" xmlns:a14="http://schemas.microsoft.com/office/drawing/2010/main" xmlns:m="http://schemas.openxmlformats.org/officeDocument/2006/math" xmlns="" val="1"/>
+              <ma14:wrappingTextBoxFlag xmlns="" xmlns:m="http://schemas.openxmlformats.org/officeDocument/2006/math" xmlns:a14="http://schemas.microsoft.com/office/drawing/2010/main" xmlns:ma14="http://schemas.microsoft.com/office/mac/drawingml/2011/main" val="1"/>
             </a:ext>
           </a:extLst>
         </p:spPr>
@@ -6853,7 +6853,7 @@
           </a:ln>
           <a:extLst>
             <a:ext uri="{C572A759-6A51-4108-AA02-DFA0A04FC94B}">
-              <ma14:wrappingTextBoxFlag xmlns:ma14="http://schemas.microsoft.com/office/mac/drawingml/2011/main" xmlns:a14="http://schemas.microsoft.com/office/drawing/2010/main" xmlns:m="http://schemas.openxmlformats.org/officeDocument/2006/math" xmlns="" val="1"/>
+              <ma14:wrappingTextBoxFlag xmlns="" xmlns:m="http://schemas.openxmlformats.org/officeDocument/2006/math" xmlns:a14="http://schemas.microsoft.com/office/drawing/2010/main" xmlns:ma14="http://schemas.microsoft.com/office/mac/drawingml/2011/main" val="1"/>
             </a:ext>
           </a:extLst>
         </p:spPr>
@@ -7098,7 +7098,7 @@
           </a:ln>
           <a:extLst>
             <a:ext uri="{C572A759-6A51-4108-AA02-DFA0A04FC94B}">
-              <ma14:wrappingTextBoxFlag xmlns:ma14="http://schemas.microsoft.com/office/mac/drawingml/2011/main" xmlns:a14="http://schemas.microsoft.com/office/drawing/2010/main" xmlns:m="http://schemas.openxmlformats.org/officeDocument/2006/math" xmlns="" val="1"/>
+              <ma14:wrappingTextBoxFlag xmlns="" xmlns:m="http://schemas.openxmlformats.org/officeDocument/2006/math" xmlns:a14="http://schemas.microsoft.com/office/drawing/2010/main" xmlns:ma14="http://schemas.microsoft.com/office/mac/drawingml/2011/main" val="1"/>
             </a:ext>
           </a:extLst>
         </p:spPr>
@@ -7133,7 +7133,7 @@
           </a:ln>
           <a:extLst>
             <a:ext uri="{C572A759-6A51-4108-AA02-DFA0A04FC94B}">
-              <ma14:wrappingTextBoxFlag xmlns:ma14="http://schemas.microsoft.com/office/mac/drawingml/2011/main" xmlns:a14="http://schemas.microsoft.com/office/drawing/2010/main" xmlns:m="http://schemas.openxmlformats.org/officeDocument/2006/math" xmlns="" val="1"/>
+              <ma14:wrappingTextBoxFlag xmlns="" xmlns:m="http://schemas.openxmlformats.org/officeDocument/2006/math" xmlns:a14="http://schemas.microsoft.com/office/drawing/2010/main" xmlns:ma14="http://schemas.microsoft.com/office/mac/drawingml/2011/main" val="1"/>
             </a:ext>
           </a:extLst>
         </p:spPr>
@@ -7180,7 +7180,7 @@
           </a:ln>
           <a:extLst>
             <a:ext uri="{C572A759-6A51-4108-AA02-DFA0A04FC94B}">
-              <ma14:wrappingTextBoxFlag xmlns:ma14="http://schemas.microsoft.com/office/mac/drawingml/2011/main" xmlns:a14="http://schemas.microsoft.com/office/drawing/2010/main" xmlns:m="http://schemas.openxmlformats.org/officeDocument/2006/math" xmlns="" val="1"/>
+              <ma14:wrappingTextBoxFlag xmlns="" xmlns:m="http://schemas.openxmlformats.org/officeDocument/2006/math" xmlns:a14="http://schemas.microsoft.com/office/drawing/2010/main" xmlns:ma14="http://schemas.microsoft.com/office/mac/drawingml/2011/main" val="1"/>
             </a:ext>
           </a:extLst>
         </p:spPr>
@@ -7227,7 +7227,7 @@
           </a:ln>
           <a:extLst>
             <a:ext uri="{C572A759-6A51-4108-AA02-DFA0A04FC94B}">
-              <ma14:wrappingTextBoxFlag xmlns:ma14="http://schemas.microsoft.com/office/mac/drawingml/2011/main" xmlns:a14="http://schemas.microsoft.com/office/drawing/2010/main" xmlns:m="http://schemas.openxmlformats.org/officeDocument/2006/math" xmlns="" val="1"/>
+              <ma14:wrappingTextBoxFlag xmlns="" xmlns:m="http://schemas.openxmlformats.org/officeDocument/2006/math" xmlns:a14="http://schemas.microsoft.com/office/drawing/2010/main" xmlns:ma14="http://schemas.microsoft.com/office/mac/drawingml/2011/main" val="1"/>
             </a:ext>
           </a:extLst>
         </p:spPr>
@@ -7615,7 +7615,7 @@
           </a:ln>
           <a:extLst>
             <a:ext uri="{C572A759-6A51-4108-AA02-DFA0A04FC94B}">
-              <ma14:wrappingTextBoxFlag xmlns:ma14="http://schemas.microsoft.com/office/mac/drawingml/2011/main" xmlns:a14="http://schemas.microsoft.com/office/drawing/2010/main" xmlns:m="http://schemas.openxmlformats.org/officeDocument/2006/math" xmlns="" val="1"/>
+              <ma14:wrappingTextBoxFlag xmlns="" xmlns:m="http://schemas.openxmlformats.org/officeDocument/2006/math" xmlns:a14="http://schemas.microsoft.com/office/drawing/2010/main" xmlns:ma14="http://schemas.microsoft.com/office/mac/drawingml/2011/main" val="1"/>
             </a:ext>
           </a:extLst>
         </p:spPr>
@@ -7661,7 +7661,7 @@
           </a:ln>
           <a:extLst>
             <a:ext uri="{C572A759-6A51-4108-AA02-DFA0A04FC94B}">
-              <ma14:wrappingTextBoxFlag xmlns:ma14="http://schemas.microsoft.com/office/mac/drawingml/2011/main" xmlns:a14="http://schemas.microsoft.com/office/drawing/2010/main" xmlns:m="http://schemas.openxmlformats.org/officeDocument/2006/math" xmlns="" val="1"/>
+              <ma14:wrappingTextBoxFlag xmlns="" xmlns:m="http://schemas.openxmlformats.org/officeDocument/2006/math" xmlns:a14="http://schemas.microsoft.com/office/drawing/2010/main" xmlns:ma14="http://schemas.microsoft.com/office/mac/drawingml/2011/main" val="1"/>
             </a:ext>
           </a:extLst>
         </p:spPr>
@@ -7707,7 +7707,7 @@
           </a:ln>
           <a:extLst>
             <a:ext uri="{C572A759-6A51-4108-AA02-DFA0A04FC94B}">
-              <ma14:wrappingTextBoxFlag xmlns:ma14="http://schemas.microsoft.com/office/mac/drawingml/2011/main" xmlns:a14="http://schemas.microsoft.com/office/drawing/2010/main" xmlns:m="http://schemas.openxmlformats.org/officeDocument/2006/math" xmlns="" val="1"/>
+              <ma14:wrappingTextBoxFlag xmlns="" xmlns:m="http://schemas.openxmlformats.org/officeDocument/2006/math" xmlns:a14="http://schemas.microsoft.com/office/drawing/2010/main" xmlns:ma14="http://schemas.microsoft.com/office/mac/drawingml/2011/main" val="1"/>
             </a:ext>
           </a:extLst>
         </p:spPr>
@@ -7753,7 +7753,7 @@
           </a:ln>
           <a:extLst>
             <a:ext uri="{C572A759-6A51-4108-AA02-DFA0A04FC94B}">
-              <ma14:wrappingTextBoxFlag xmlns:ma14="http://schemas.microsoft.com/office/mac/drawingml/2011/main" xmlns:a14="http://schemas.microsoft.com/office/drawing/2010/main" xmlns:m="http://schemas.openxmlformats.org/officeDocument/2006/math" xmlns="" val="1"/>
+              <ma14:wrappingTextBoxFlag xmlns="" xmlns:m="http://schemas.openxmlformats.org/officeDocument/2006/math" xmlns:a14="http://schemas.microsoft.com/office/drawing/2010/main" xmlns:ma14="http://schemas.microsoft.com/office/mac/drawingml/2011/main" val="1"/>
             </a:ext>
           </a:extLst>
         </p:spPr>
@@ -7799,7 +7799,7 @@
           </a:ln>
           <a:extLst>
             <a:ext uri="{C572A759-6A51-4108-AA02-DFA0A04FC94B}">
-              <ma14:wrappingTextBoxFlag xmlns:ma14="http://schemas.microsoft.com/office/mac/drawingml/2011/main" xmlns:a14="http://schemas.microsoft.com/office/drawing/2010/main" xmlns:m="http://schemas.openxmlformats.org/officeDocument/2006/math" xmlns="" val="1"/>
+              <ma14:wrappingTextBoxFlag xmlns="" xmlns:m="http://schemas.openxmlformats.org/officeDocument/2006/math" xmlns:a14="http://schemas.microsoft.com/office/drawing/2010/main" xmlns:ma14="http://schemas.microsoft.com/office/mac/drawingml/2011/main" val="1"/>
             </a:ext>
           </a:extLst>
         </p:spPr>
@@ -7871,7 +7871,7 @@
           </a:ln>
           <a:extLst>
             <a:ext uri="{C572A759-6A51-4108-AA02-DFA0A04FC94B}">
-              <ma14:wrappingTextBoxFlag xmlns:ma14="http://schemas.microsoft.com/office/mac/drawingml/2011/main" xmlns:a14="http://schemas.microsoft.com/office/drawing/2010/main" xmlns:m="http://schemas.openxmlformats.org/officeDocument/2006/math" xmlns="" val="1"/>
+              <ma14:wrappingTextBoxFlag xmlns="" xmlns:m="http://schemas.openxmlformats.org/officeDocument/2006/math" xmlns:a14="http://schemas.microsoft.com/office/drawing/2010/main" xmlns:ma14="http://schemas.microsoft.com/office/mac/drawingml/2011/main" val="1"/>
             </a:ext>
           </a:extLst>
         </p:spPr>
@@ -7943,7 +7943,7 @@
           </a:ln>
           <a:extLst>
             <a:ext uri="{C572A759-6A51-4108-AA02-DFA0A04FC94B}">
-              <ma14:wrappingTextBoxFlag xmlns:ma14="http://schemas.microsoft.com/office/mac/drawingml/2011/main" xmlns:a14="http://schemas.microsoft.com/office/drawing/2010/main" xmlns:m="http://schemas.openxmlformats.org/officeDocument/2006/math" xmlns="" val="1"/>
+              <ma14:wrappingTextBoxFlag xmlns="" xmlns:m="http://schemas.openxmlformats.org/officeDocument/2006/math" xmlns:a14="http://schemas.microsoft.com/office/drawing/2010/main" xmlns:ma14="http://schemas.microsoft.com/office/mac/drawingml/2011/main" val="1"/>
             </a:ext>
           </a:extLst>
         </p:spPr>
@@ -8015,7 +8015,7 @@
           </a:ln>
           <a:extLst>
             <a:ext uri="{C572A759-6A51-4108-AA02-DFA0A04FC94B}">
-              <ma14:wrappingTextBoxFlag xmlns:ma14="http://schemas.microsoft.com/office/mac/drawingml/2011/main" xmlns:a14="http://schemas.microsoft.com/office/drawing/2010/main" xmlns:m="http://schemas.openxmlformats.org/officeDocument/2006/math" xmlns="" val="1"/>
+              <ma14:wrappingTextBoxFlag xmlns="" xmlns:m="http://schemas.openxmlformats.org/officeDocument/2006/math" xmlns:a14="http://schemas.microsoft.com/office/drawing/2010/main" xmlns:ma14="http://schemas.microsoft.com/office/mac/drawingml/2011/main" val="1"/>
             </a:ext>
           </a:extLst>
         </p:spPr>
@@ -8135,7 +8135,7 @@
           </a:ln>
           <a:extLst>
             <a:ext uri="{C572A759-6A51-4108-AA02-DFA0A04FC94B}">
-              <ma14:wrappingTextBoxFlag xmlns:ma14="http://schemas.microsoft.com/office/mac/drawingml/2011/main" xmlns:a14="http://schemas.microsoft.com/office/drawing/2010/main" xmlns:m="http://schemas.openxmlformats.org/officeDocument/2006/math" xmlns="" val="1"/>
+              <ma14:wrappingTextBoxFlag xmlns="" xmlns:m="http://schemas.openxmlformats.org/officeDocument/2006/math" xmlns:a14="http://schemas.microsoft.com/office/drawing/2010/main" xmlns:ma14="http://schemas.microsoft.com/office/mac/drawingml/2011/main" val="1"/>
             </a:ext>
           </a:extLst>
         </p:spPr>
@@ -8183,7 +8183,7 @@
           </a:ln>
           <a:extLst>
             <a:ext uri="{C572A759-6A51-4108-AA02-DFA0A04FC94B}">
-              <ma14:wrappingTextBoxFlag xmlns:ma14="http://schemas.microsoft.com/office/mac/drawingml/2011/main" xmlns:a14="http://schemas.microsoft.com/office/drawing/2010/main" xmlns:m="http://schemas.openxmlformats.org/officeDocument/2006/math" xmlns="" val="1"/>
+              <ma14:wrappingTextBoxFlag xmlns="" xmlns:m="http://schemas.openxmlformats.org/officeDocument/2006/math" xmlns:a14="http://schemas.microsoft.com/office/drawing/2010/main" xmlns:ma14="http://schemas.microsoft.com/office/mac/drawingml/2011/main" val="1"/>
             </a:ext>
           </a:extLst>
         </p:spPr>
@@ -8228,7 +8228,7 @@
           </a:ln>
           <a:extLst>
             <a:ext uri="{C572A759-6A51-4108-AA02-DFA0A04FC94B}">
-              <ma14:wrappingTextBoxFlag xmlns:ma14="http://schemas.microsoft.com/office/mac/drawingml/2011/main" xmlns:a14="http://schemas.microsoft.com/office/drawing/2010/main" xmlns:m="http://schemas.openxmlformats.org/officeDocument/2006/math" xmlns="" val="1"/>
+              <ma14:wrappingTextBoxFlag xmlns="" xmlns:m="http://schemas.openxmlformats.org/officeDocument/2006/math" xmlns:a14="http://schemas.microsoft.com/office/drawing/2010/main" xmlns:ma14="http://schemas.microsoft.com/office/mac/drawingml/2011/main" val="1"/>
             </a:ext>
           </a:extLst>
         </p:spPr>
@@ -8273,7 +8273,7 @@
           </a:ln>
           <a:extLst>
             <a:ext uri="{C572A759-6A51-4108-AA02-DFA0A04FC94B}">
-              <ma14:wrappingTextBoxFlag xmlns:ma14="http://schemas.microsoft.com/office/mac/drawingml/2011/main" xmlns:a14="http://schemas.microsoft.com/office/drawing/2010/main" xmlns:m="http://schemas.openxmlformats.org/officeDocument/2006/math" xmlns="" val="1"/>
+              <ma14:wrappingTextBoxFlag xmlns="" xmlns:m="http://schemas.openxmlformats.org/officeDocument/2006/math" xmlns:a14="http://schemas.microsoft.com/office/drawing/2010/main" xmlns:ma14="http://schemas.microsoft.com/office/mac/drawingml/2011/main" val="1"/>
             </a:ext>
           </a:extLst>
         </p:spPr>
@@ -8577,7 +8577,7 @@
           </a:ln>
           <a:extLst>
             <a:ext uri="{C572A759-6A51-4108-AA02-DFA0A04FC94B}">
-              <ma14:wrappingTextBoxFlag xmlns:ma14="http://schemas.microsoft.com/office/mac/drawingml/2011/main" xmlns:a14="http://schemas.microsoft.com/office/drawing/2010/main" xmlns:m="http://schemas.openxmlformats.org/officeDocument/2006/math" xmlns="" val="1"/>
+              <ma14:wrappingTextBoxFlag xmlns="" xmlns:m="http://schemas.openxmlformats.org/officeDocument/2006/math" xmlns:a14="http://schemas.microsoft.com/office/drawing/2010/main" xmlns:ma14="http://schemas.microsoft.com/office/mac/drawingml/2011/main" val="1"/>
             </a:ext>
           </a:extLst>
         </p:spPr>
@@ -8612,7 +8612,7 @@
           </a:ln>
           <a:extLst>
             <a:ext uri="{C572A759-6A51-4108-AA02-DFA0A04FC94B}">
-              <ma14:wrappingTextBoxFlag xmlns:ma14="http://schemas.microsoft.com/office/mac/drawingml/2011/main" xmlns:a14="http://schemas.microsoft.com/office/drawing/2010/main" xmlns:m="http://schemas.openxmlformats.org/officeDocument/2006/math" xmlns="" val="1"/>
+              <ma14:wrappingTextBoxFlag xmlns="" xmlns:m="http://schemas.openxmlformats.org/officeDocument/2006/math" xmlns:a14="http://schemas.microsoft.com/office/drawing/2010/main" xmlns:ma14="http://schemas.microsoft.com/office/mac/drawingml/2011/main" val="1"/>
             </a:ext>
           </a:extLst>
         </p:spPr>
@@ -8659,7 +8659,7 @@
           </a:ln>
           <a:extLst>
             <a:ext uri="{C572A759-6A51-4108-AA02-DFA0A04FC94B}">
-              <ma14:wrappingTextBoxFlag xmlns:ma14="http://schemas.microsoft.com/office/mac/drawingml/2011/main" xmlns:a14="http://schemas.microsoft.com/office/drawing/2010/main" xmlns:m="http://schemas.openxmlformats.org/officeDocument/2006/math" xmlns="" val="1"/>
+              <ma14:wrappingTextBoxFlag xmlns="" xmlns:m="http://schemas.openxmlformats.org/officeDocument/2006/math" xmlns:a14="http://schemas.microsoft.com/office/drawing/2010/main" xmlns:ma14="http://schemas.microsoft.com/office/mac/drawingml/2011/main" val="1"/>
             </a:ext>
           </a:extLst>
         </p:spPr>
@@ -8706,7 +8706,7 @@
           </a:ln>
           <a:extLst>
             <a:ext uri="{C572A759-6A51-4108-AA02-DFA0A04FC94B}">
-              <ma14:wrappingTextBoxFlag xmlns:ma14="http://schemas.microsoft.com/office/mac/drawingml/2011/main" xmlns:a14="http://schemas.microsoft.com/office/drawing/2010/main" xmlns:m="http://schemas.openxmlformats.org/officeDocument/2006/math" xmlns="" val="1"/>
+              <ma14:wrappingTextBoxFlag xmlns="" xmlns:m="http://schemas.openxmlformats.org/officeDocument/2006/math" xmlns:a14="http://schemas.microsoft.com/office/drawing/2010/main" xmlns:ma14="http://schemas.microsoft.com/office/mac/drawingml/2011/main" val="1"/>
             </a:ext>
           </a:extLst>
         </p:spPr>
@@ -9094,7 +9094,7 @@
           </a:ln>
           <a:extLst>
             <a:ext uri="{C572A759-6A51-4108-AA02-DFA0A04FC94B}">
-              <ma14:wrappingTextBoxFlag xmlns:ma14="http://schemas.microsoft.com/office/mac/drawingml/2011/main" xmlns:a14="http://schemas.microsoft.com/office/drawing/2010/main" xmlns:m="http://schemas.openxmlformats.org/officeDocument/2006/math" xmlns="" val="1"/>
+              <ma14:wrappingTextBoxFlag xmlns="" xmlns:m="http://schemas.openxmlformats.org/officeDocument/2006/math" xmlns:a14="http://schemas.microsoft.com/office/drawing/2010/main" xmlns:ma14="http://schemas.microsoft.com/office/mac/drawingml/2011/main" val="1"/>
             </a:ext>
           </a:extLst>
         </p:spPr>
@@ -9140,7 +9140,7 @@
           </a:ln>
           <a:extLst>
             <a:ext uri="{C572A759-6A51-4108-AA02-DFA0A04FC94B}">
-              <ma14:wrappingTextBoxFlag xmlns:ma14="http://schemas.microsoft.com/office/mac/drawingml/2011/main" xmlns:a14="http://schemas.microsoft.com/office/drawing/2010/main" xmlns:m="http://schemas.openxmlformats.org/officeDocument/2006/math" xmlns="" val="1"/>
+              <ma14:wrappingTextBoxFlag xmlns="" xmlns:m="http://schemas.openxmlformats.org/officeDocument/2006/math" xmlns:a14="http://schemas.microsoft.com/office/drawing/2010/main" xmlns:ma14="http://schemas.microsoft.com/office/mac/drawingml/2011/main" val="1"/>
             </a:ext>
           </a:extLst>
         </p:spPr>
@@ -9186,7 +9186,7 @@
           </a:ln>
           <a:extLst>
             <a:ext uri="{C572A759-6A51-4108-AA02-DFA0A04FC94B}">
-              <ma14:wrappingTextBoxFlag xmlns:ma14="http://schemas.microsoft.com/office/mac/drawingml/2011/main" xmlns:a14="http://schemas.microsoft.com/office/drawing/2010/main" xmlns:m="http://schemas.openxmlformats.org/officeDocument/2006/math" xmlns="" val="1"/>
+              <ma14:wrappingTextBoxFlag xmlns="" xmlns:m="http://schemas.openxmlformats.org/officeDocument/2006/math" xmlns:a14="http://schemas.microsoft.com/office/drawing/2010/main" xmlns:ma14="http://schemas.microsoft.com/office/mac/drawingml/2011/main" val="1"/>
             </a:ext>
           </a:extLst>
         </p:spPr>
@@ -9232,7 +9232,7 @@
           </a:ln>
           <a:extLst>
             <a:ext uri="{C572A759-6A51-4108-AA02-DFA0A04FC94B}">
-              <ma14:wrappingTextBoxFlag xmlns:ma14="http://schemas.microsoft.com/office/mac/drawingml/2011/main" xmlns:a14="http://schemas.microsoft.com/office/drawing/2010/main" xmlns:m="http://schemas.openxmlformats.org/officeDocument/2006/math" xmlns="" val="1"/>
+              <ma14:wrappingTextBoxFlag xmlns="" xmlns:m="http://schemas.openxmlformats.org/officeDocument/2006/math" xmlns:a14="http://schemas.microsoft.com/office/drawing/2010/main" xmlns:ma14="http://schemas.microsoft.com/office/mac/drawingml/2011/main" val="1"/>
             </a:ext>
           </a:extLst>
         </p:spPr>
@@ -9278,7 +9278,7 @@
           </a:ln>
           <a:extLst>
             <a:ext uri="{C572A759-6A51-4108-AA02-DFA0A04FC94B}">
-              <ma14:wrappingTextBoxFlag xmlns:ma14="http://schemas.microsoft.com/office/mac/drawingml/2011/main" xmlns:a14="http://schemas.microsoft.com/office/drawing/2010/main" xmlns:m="http://schemas.openxmlformats.org/officeDocument/2006/math" xmlns="" val="1"/>
+              <ma14:wrappingTextBoxFlag xmlns="" xmlns:m="http://schemas.openxmlformats.org/officeDocument/2006/math" xmlns:a14="http://schemas.microsoft.com/office/drawing/2010/main" xmlns:ma14="http://schemas.microsoft.com/office/mac/drawingml/2011/main" val="1"/>
             </a:ext>
           </a:extLst>
         </p:spPr>
@@ -9350,7 +9350,7 @@
           </a:ln>
           <a:extLst>
             <a:ext uri="{C572A759-6A51-4108-AA02-DFA0A04FC94B}">
-              <ma14:wrappingTextBoxFlag xmlns:ma14="http://schemas.microsoft.com/office/mac/drawingml/2011/main" xmlns:a14="http://schemas.microsoft.com/office/drawing/2010/main" xmlns:m="http://schemas.openxmlformats.org/officeDocument/2006/math" xmlns="" val="1"/>
+              <ma14:wrappingTextBoxFlag xmlns="" xmlns:m="http://schemas.openxmlformats.org/officeDocument/2006/math" xmlns:a14="http://schemas.microsoft.com/office/drawing/2010/main" xmlns:ma14="http://schemas.microsoft.com/office/mac/drawingml/2011/main" val="1"/>
             </a:ext>
           </a:extLst>
         </p:spPr>
@@ -9422,7 +9422,7 @@
           </a:ln>
           <a:extLst>
             <a:ext uri="{C572A759-6A51-4108-AA02-DFA0A04FC94B}">
-              <ma14:wrappingTextBoxFlag xmlns:ma14="http://schemas.microsoft.com/office/mac/drawingml/2011/main" xmlns:a14="http://schemas.microsoft.com/office/drawing/2010/main" xmlns:m="http://schemas.openxmlformats.org/officeDocument/2006/math" xmlns="" val="1"/>
+              <ma14:wrappingTextBoxFlag xmlns="" xmlns:m="http://schemas.openxmlformats.org/officeDocument/2006/math" xmlns:a14="http://schemas.microsoft.com/office/drawing/2010/main" xmlns:ma14="http://schemas.microsoft.com/office/mac/drawingml/2011/main" val="1"/>
             </a:ext>
           </a:extLst>
         </p:spPr>
@@ -9494,7 +9494,7 @@
           </a:ln>
           <a:extLst>
             <a:ext uri="{C572A759-6A51-4108-AA02-DFA0A04FC94B}">
-              <ma14:wrappingTextBoxFlag xmlns:ma14="http://schemas.microsoft.com/office/mac/drawingml/2011/main" xmlns:a14="http://schemas.microsoft.com/office/drawing/2010/main" xmlns:m="http://schemas.openxmlformats.org/officeDocument/2006/math" xmlns="" val="1"/>
+              <ma14:wrappingTextBoxFlag xmlns="" xmlns:m="http://schemas.openxmlformats.org/officeDocument/2006/math" xmlns:a14="http://schemas.microsoft.com/office/drawing/2010/main" xmlns:ma14="http://schemas.microsoft.com/office/mac/drawingml/2011/main" val="1"/>
             </a:ext>
           </a:extLst>
         </p:spPr>
@@ -9609,7 +9609,7 @@
           </a:ln>
           <a:extLst>
             <a:ext uri="{C572A759-6A51-4108-AA02-DFA0A04FC94B}">
-              <ma14:wrappingTextBoxFlag xmlns:ma14="http://schemas.microsoft.com/office/mac/drawingml/2011/main" xmlns:a14="http://schemas.microsoft.com/office/drawing/2010/main" xmlns:m="http://schemas.openxmlformats.org/officeDocument/2006/math" xmlns="" val="1"/>
+              <ma14:wrappingTextBoxFlag xmlns="" xmlns:m="http://schemas.openxmlformats.org/officeDocument/2006/math" xmlns:a14="http://schemas.microsoft.com/office/drawing/2010/main" xmlns:ma14="http://schemas.microsoft.com/office/mac/drawingml/2011/main" val="1"/>
             </a:ext>
           </a:extLst>
         </p:spPr>
@@ -9686,7 +9686,7 @@
           </a:ln>
           <a:extLst>
             <a:ext uri="{C572A759-6A51-4108-AA02-DFA0A04FC94B}">
-              <ma14:wrappingTextBoxFlag xmlns:ma14="http://schemas.microsoft.com/office/mac/drawingml/2011/main" xmlns:a14="http://schemas.microsoft.com/office/drawing/2010/main" xmlns:m="http://schemas.openxmlformats.org/officeDocument/2006/math" xmlns="" val="1"/>
+              <ma14:wrappingTextBoxFlag xmlns="" xmlns:m="http://schemas.openxmlformats.org/officeDocument/2006/math" xmlns:a14="http://schemas.microsoft.com/office/drawing/2010/main" xmlns:ma14="http://schemas.microsoft.com/office/mac/drawingml/2011/main" val="1"/>
             </a:ext>
           </a:extLst>
         </p:spPr>
@@ -9734,7 +9734,7 @@
           </a:ln>
           <a:extLst>
             <a:ext uri="{C572A759-6A51-4108-AA02-DFA0A04FC94B}">
-              <ma14:wrappingTextBoxFlag xmlns:ma14="http://schemas.microsoft.com/office/mac/drawingml/2011/main" xmlns:a14="http://schemas.microsoft.com/office/drawing/2010/main" xmlns:m="http://schemas.openxmlformats.org/officeDocument/2006/math" xmlns="" val="1"/>
+              <ma14:wrappingTextBoxFlag xmlns="" xmlns:m="http://schemas.openxmlformats.org/officeDocument/2006/math" xmlns:a14="http://schemas.microsoft.com/office/drawing/2010/main" xmlns:ma14="http://schemas.microsoft.com/office/mac/drawingml/2011/main" val="1"/>
             </a:ext>
           </a:extLst>
         </p:spPr>
@@ -9779,7 +9779,7 @@
           </a:ln>
           <a:extLst>
             <a:ext uri="{C572A759-6A51-4108-AA02-DFA0A04FC94B}">
-              <ma14:wrappingTextBoxFlag xmlns:ma14="http://schemas.microsoft.com/office/mac/drawingml/2011/main" xmlns:a14="http://schemas.microsoft.com/office/drawing/2010/main" xmlns:m="http://schemas.openxmlformats.org/officeDocument/2006/math" xmlns="" val="1"/>
+              <ma14:wrappingTextBoxFlag xmlns="" xmlns:m="http://schemas.openxmlformats.org/officeDocument/2006/math" xmlns:a14="http://schemas.microsoft.com/office/drawing/2010/main" xmlns:ma14="http://schemas.microsoft.com/office/mac/drawingml/2011/main" val="1"/>
             </a:ext>
           </a:extLst>
         </p:spPr>
@@ -9824,7 +9824,7 @@
           </a:ln>
           <a:extLst>
             <a:ext uri="{C572A759-6A51-4108-AA02-DFA0A04FC94B}">
-              <ma14:wrappingTextBoxFlag xmlns:ma14="http://schemas.microsoft.com/office/mac/drawingml/2011/main" xmlns:a14="http://schemas.microsoft.com/office/drawing/2010/main" xmlns:m="http://schemas.openxmlformats.org/officeDocument/2006/math" xmlns="" val="1"/>
+              <ma14:wrappingTextBoxFlag xmlns="" xmlns:m="http://schemas.openxmlformats.org/officeDocument/2006/math" xmlns:a14="http://schemas.microsoft.com/office/drawing/2010/main" xmlns:ma14="http://schemas.microsoft.com/office/mac/drawingml/2011/main" val="1"/>
             </a:ext>
           </a:extLst>
         </p:spPr>
@@ -10128,7 +10128,7 @@
           </a:ln>
           <a:extLst>
             <a:ext uri="{C572A759-6A51-4108-AA02-DFA0A04FC94B}">
-              <ma14:wrappingTextBoxFlag xmlns:ma14="http://schemas.microsoft.com/office/mac/drawingml/2011/main" xmlns:a14="http://schemas.microsoft.com/office/drawing/2010/main" xmlns:m="http://schemas.openxmlformats.org/officeDocument/2006/math" xmlns="" val="1"/>
+              <ma14:wrappingTextBoxFlag xmlns="" xmlns:m="http://schemas.openxmlformats.org/officeDocument/2006/math" xmlns:a14="http://schemas.microsoft.com/office/drawing/2010/main" xmlns:ma14="http://schemas.microsoft.com/office/mac/drawingml/2011/main" val="1"/>
             </a:ext>
           </a:extLst>
         </p:spPr>
@@ -10163,7 +10163,7 @@
           </a:ln>
           <a:extLst>
             <a:ext uri="{C572A759-6A51-4108-AA02-DFA0A04FC94B}">
-              <ma14:wrappingTextBoxFlag xmlns:ma14="http://schemas.microsoft.com/office/mac/drawingml/2011/main" xmlns:a14="http://schemas.microsoft.com/office/drawing/2010/main" xmlns:m="http://schemas.openxmlformats.org/officeDocument/2006/math" xmlns="" val="1"/>
+              <ma14:wrappingTextBoxFlag xmlns="" xmlns:m="http://schemas.openxmlformats.org/officeDocument/2006/math" xmlns:a14="http://schemas.microsoft.com/office/drawing/2010/main" xmlns:ma14="http://schemas.microsoft.com/office/mac/drawingml/2011/main" val="1"/>
             </a:ext>
           </a:extLst>
         </p:spPr>
@@ -10210,7 +10210,7 @@
           </a:ln>
           <a:extLst>
             <a:ext uri="{C572A759-6A51-4108-AA02-DFA0A04FC94B}">
-              <ma14:wrappingTextBoxFlag xmlns:ma14="http://schemas.microsoft.com/office/mac/drawingml/2011/main" xmlns:a14="http://schemas.microsoft.com/office/drawing/2010/main" xmlns:m="http://schemas.openxmlformats.org/officeDocument/2006/math" xmlns="" val="1"/>
+              <ma14:wrappingTextBoxFlag xmlns="" xmlns:m="http://schemas.openxmlformats.org/officeDocument/2006/math" xmlns:a14="http://schemas.microsoft.com/office/drawing/2010/main" xmlns:ma14="http://schemas.microsoft.com/office/mac/drawingml/2011/main" val="1"/>
             </a:ext>
           </a:extLst>
         </p:spPr>
@@ -10257,7 +10257,7 @@
           </a:ln>
           <a:extLst>
             <a:ext uri="{C572A759-6A51-4108-AA02-DFA0A04FC94B}">
-              <ma14:wrappingTextBoxFlag xmlns:ma14="http://schemas.microsoft.com/office/mac/drawingml/2011/main" xmlns:a14="http://schemas.microsoft.com/office/drawing/2010/main" xmlns:m="http://schemas.openxmlformats.org/officeDocument/2006/math" xmlns="" val="1"/>
+              <ma14:wrappingTextBoxFlag xmlns="" xmlns:m="http://schemas.openxmlformats.org/officeDocument/2006/math" xmlns:a14="http://schemas.microsoft.com/office/drawing/2010/main" xmlns:ma14="http://schemas.microsoft.com/office/mac/drawingml/2011/main" val="1"/>
             </a:ext>
           </a:extLst>
         </p:spPr>
@@ -10645,7 +10645,7 @@
           </a:ln>
           <a:extLst>
             <a:ext uri="{C572A759-6A51-4108-AA02-DFA0A04FC94B}">
-              <ma14:wrappingTextBoxFlag xmlns:ma14="http://schemas.microsoft.com/office/mac/drawingml/2011/main" xmlns:a14="http://schemas.microsoft.com/office/drawing/2010/main" xmlns:m="http://schemas.openxmlformats.org/officeDocument/2006/math" xmlns="" val="1"/>
+              <ma14:wrappingTextBoxFlag xmlns="" xmlns:m="http://schemas.openxmlformats.org/officeDocument/2006/math" xmlns:a14="http://schemas.microsoft.com/office/drawing/2010/main" xmlns:ma14="http://schemas.microsoft.com/office/mac/drawingml/2011/main" val="1"/>
             </a:ext>
           </a:extLst>
         </p:spPr>
@@ -10691,7 +10691,7 @@
           </a:ln>
           <a:extLst>
             <a:ext uri="{C572A759-6A51-4108-AA02-DFA0A04FC94B}">
-              <ma14:wrappingTextBoxFlag xmlns:ma14="http://schemas.microsoft.com/office/mac/drawingml/2011/main" xmlns:a14="http://schemas.microsoft.com/office/drawing/2010/main" xmlns:m="http://schemas.openxmlformats.org/officeDocument/2006/math" xmlns="" val="1"/>
+              <ma14:wrappingTextBoxFlag xmlns="" xmlns:m="http://schemas.openxmlformats.org/officeDocument/2006/math" xmlns:a14="http://schemas.microsoft.com/office/drawing/2010/main" xmlns:ma14="http://schemas.microsoft.com/office/mac/drawingml/2011/main" val="1"/>
             </a:ext>
           </a:extLst>
         </p:spPr>
@@ -10737,7 +10737,7 @@
           </a:ln>
           <a:extLst>
             <a:ext uri="{C572A759-6A51-4108-AA02-DFA0A04FC94B}">
-              <ma14:wrappingTextBoxFlag xmlns:ma14="http://schemas.microsoft.com/office/mac/drawingml/2011/main" xmlns:a14="http://schemas.microsoft.com/office/drawing/2010/main" xmlns:m="http://schemas.openxmlformats.org/officeDocument/2006/math" xmlns="" val="1"/>
+              <ma14:wrappingTextBoxFlag xmlns="" xmlns:m="http://schemas.openxmlformats.org/officeDocument/2006/math" xmlns:a14="http://schemas.microsoft.com/office/drawing/2010/main" xmlns:ma14="http://schemas.microsoft.com/office/mac/drawingml/2011/main" val="1"/>
             </a:ext>
           </a:extLst>
         </p:spPr>
@@ -10783,7 +10783,7 @@
           </a:ln>
           <a:extLst>
             <a:ext uri="{C572A759-6A51-4108-AA02-DFA0A04FC94B}">
-              <ma14:wrappingTextBoxFlag xmlns:ma14="http://schemas.microsoft.com/office/mac/drawingml/2011/main" xmlns:a14="http://schemas.microsoft.com/office/drawing/2010/main" xmlns:m="http://schemas.openxmlformats.org/officeDocument/2006/math" xmlns="" val="1"/>
+              <ma14:wrappingTextBoxFlag xmlns="" xmlns:m="http://schemas.openxmlformats.org/officeDocument/2006/math" xmlns:a14="http://schemas.microsoft.com/office/drawing/2010/main" xmlns:ma14="http://schemas.microsoft.com/office/mac/drawingml/2011/main" val="1"/>
             </a:ext>
           </a:extLst>
         </p:spPr>
@@ -10829,7 +10829,7 @@
           </a:ln>
           <a:extLst>
             <a:ext uri="{C572A759-6A51-4108-AA02-DFA0A04FC94B}">
-              <ma14:wrappingTextBoxFlag xmlns:ma14="http://schemas.microsoft.com/office/mac/drawingml/2011/main" xmlns:a14="http://schemas.microsoft.com/office/drawing/2010/main" xmlns:m="http://schemas.openxmlformats.org/officeDocument/2006/math" xmlns="" val="1"/>
+              <ma14:wrappingTextBoxFlag xmlns="" xmlns:m="http://schemas.openxmlformats.org/officeDocument/2006/math" xmlns:a14="http://schemas.microsoft.com/office/drawing/2010/main" xmlns:ma14="http://schemas.microsoft.com/office/mac/drawingml/2011/main" val="1"/>
             </a:ext>
           </a:extLst>
         </p:spPr>
@@ -10875,7 +10875,7 @@
           </a:ln>
           <a:extLst>
             <a:ext uri="{C572A759-6A51-4108-AA02-DFA0A04FC94B}">
-              <ma14:wrappingTextBoxFlag xmlns:ma14="http://schemas.microsoft.com/office/mac/drawingml/2011/main" xmlns:a14="http://schemas.microsoft.com/office/drawing/2010/main" xmlns:m="http://schemas.openxmlformats.org/officeDocument/2006/math" xmlns="" val="1"/>
+              <ma14:wrappingTextBoxFlag xmlns="" xmlns:m="http://schemas.openxmlformats.org/officeDocument/2006/math" xmlns:a14="http://schemas.microsoft.com/office/drawing/2010/main" xmlns:ma14="http://schemas.microsoft.com/office/mac/drawingml/2011/main" val="1"/>
             </a:ext>
           </a:extLst>
         </p:spPr>
@@ -10947,7 +10947,7 @@
           </a:ln>
           <a:extLst>
             <a:ext uri="{C572A759-6A51-4108-AA02-DFA0A04FC94B}">
-              <ma14:wrappingTextBoxFlag xmlns:ma14="http://schemas.microsoft.com/office/mac/drawingml/2011/main" xmlns:a14="http://schemas.microsoft.com/office/drawing/2010/main" xmlns:m="http://schemas.openxmlformats.org/officeDocument/2006/math" xmlns="" val="1"/>
+              <ma14:wrappingTextBoxFlag xmlns="" xmlns:m="http://schemas.openxmlformats.org/officeDocument/2006/math" xmlns:a14="http://schemas.microsoft.com/office/drawing/2010/main" xmlns:ma14="http://schemas.microsoft.com/office/mac/drawingml/2011/main" val="1"/>
             </a:ext>
           </a:extLst>
         </p:spPr>
@@ -11019,7 +11019,7 @@
           </a:ln>
           <a:extLst>
             <a:ext uri="{C572A759-6A51-4108-AA02-DFA0A04FC94B}">
-              <ma14:wrappingTextBoxFlag xmlns:ma14="http://schemas.microsoft.com/office/mac/drawingml/2011/main" xmlns:a14="http://schemas.microsoft.com/office/drawing/2010/main" xmlns:m="http://schemas.openxmlformats.org/officeDocument/2006/math" xmlns="" val="1"/>
+              <ma14:wrappingTextBoxFlag xmlns="" xmlns:m="http://schemas.openxmlformats.org/officeDocument/2006/math" xmlns:a14="http://schemas.microsoft.com/office/drawing/2010/main" xmlns:ma14="http://schemas.microsoft.com/office/mac/drawingml/2011/main" val="1"/>
             </a:ext>
           </a:extLst>
         </p:spPr>
@@ -11091,7 +11091,7 @@
           </a:ln>
           <a:extLst>
             <a:ext uri="{C572A759-6A51-4108-AA02-DFA0A04FC94B}">
-              <ma14:wrappingTextBoxFlag xmlns:ma14="http://schemas.microsoft.com/office/mac/drawingml/2011/main" xmlns:a14="http://schemas.microsoft.com/office/drawing/2010/main" xmlns:m="http://schemas.openxmlformats.org/officeDocument/2006/math" xmlns="" val="1"/>
+              <ma14:wrappingTextBoxFlag xmlns="" xmlns:m="http://schemas.openxmlformats.org/officeDocument/2006/math" xmlns:a14="http://schemas.microsoft.com/office/drawing/2010/main" xmlns:ma14="http://schemas.microsoft.com/office/mac/drawingml/2011/main" val="1"/>
             </a:ext>
           </a:extLst>
         </p:spPr>
@@ -11206,7 +11206,7 @@
           </a:ln>
           <a:extLst>
             <a:ext uri="{C572A759-6A51-4108-AA02-DFA0A04FC94B}">
-              <ma14:wrappingTextBoxFlag xmlns:ma14="http://schemas.microsoft.com/office/mac/drawingml/2011/main" xmlns:a14="http://schemas.microsoft.com/office/drawing/2010/main" xmlns:m="http://schemas.openxmlformats.org/officeDocument/2006/math" xmlns="" val="1"/>
+              <ma14:wrappingTextBoxFlag xmlns="" xmlns:m="http://schemas.openxmlformats.org/officeDocument/2006/math" xmlns:a14="http://schemas.microsoft.com/office/drawing/2010/main" xmlns:ma14="http://schemas.microsoft.com/office/mac/drawingml/2011/main" val="1"/>
             </a:ext>
           </a:extLst>
         </p:spPr>
@@ -11283,7 +11283,7 @@
           </a:ln>
           <a:extLst>
             <a:ext uri="{C572A759-6A51-4108-AA02-DFA0A04FC94B}">
-              <ma14:wrappingTextBoxFlag xmlns:ma14="http://schemas.microsoft.com/office/mac/drawingml/2011/main" xmlns:a14="http://schemas.microsoft.com/office/drawing/2010/main" xmlns:m="http://schemas.openxmlformats.org/officeDocument/2006/math" xmlns="" val="1"/>
+              <ma14:wrappingTextBoxFlag xmlns="" xmlns:m="http://schemas.openxmlformats.org/officeDocument/2006/math" xmlns:a14="http://schemas.microsoft.com/office/drawing/2010/main" xmlns:ma14="http://schemas.microsoft.com/office/mac/drawingml/2011/main" val="1"/>
             </a:ext>
           </a:extLst>
         </p:spPr>
@@ -11331,7 +11331,7 @@
           </a:ln>
           <a:extLst>
             <a:ext uri="{C572A759-6A51-4108-AA02-DFA0A04FC94B}">
-              <ma14:wrappingTextBoxFlag xmlns:ma14="http://schemas.microsoft.com/office/mac/drawingml/2011/main" xmlns:a14="http://schemas.microsoft.com/office/drawing/2010/main" xmlns:m="http://schemas.openxmlformats.org/officeDocument/2006/math" xmlns="" val="1"/>
+              <ma14:wrappingTextBoxFlag xmlns="" xmlns:m="http://schemas.openxmlformats.org/officeDocument/2006/math" xmlns:a14="http://schemas.microsoft.com/office/drawing/2010/main" xmlns:ma14="http://schemas.microsoft.com/office/mac/drawingml/2011/main" val="1"/>
             </a:ext>
           </a:extLst>
         </p:spPr>
@@ -11376,7 +11376,7 @@
           </a:ln>
           <a:extLst>
             <a:ext uri="{C572A759-6A51-4108-AA02-DFA0A04FC94B}">
-              <ma14:wrappingTextBoxFlag xmlns:ma14="http://schemas.microsoft.com/office/mac/drawingml/2011/main" xmlns:a14="http://schemas.microsoft.com/office/drawing/2010/main" xmlns:m="http://schemas.openxmlformats.org/officeDocument/2006/math" xmlns="" val="1"/>
+              <ma14:wrappingTextBoxFlag xmlns="" xmlns:m="http://schemas.openxmlformats.org/officeDocument/2006/math" xmlns:a14="http://schemas.microsoft.com/office/drawing/2010/main" xmlns:ma14="http://schemas.microsoft.com/office/mac/drawingml/2011/main" val="1"/>
             </a:ext>
           </a:extLst>
         </p:spPr>
@@ -11421,7 +11421,7 @@
           </a:ln>
           <a:extLst>
             <a:ext uri="{C572A759-6A51-4108-AA02-DFA0A04FC94B}">
-              <ma14:wrappingTextBoxFlag xmlns:ma14="http://schemas.microsoft.com/office/mac/drawingml/2011/main" xmlns:a14="http://schemas.microsoft.com/office/drawing/2010/main" xmlns:m="http://schemas.openxmlformats.org/officeDocument/2006/math" xmlns="" val="1"/>
+              <ma14:wrappingTextBoxFlag xmlns="" xmlns:m="http://schemas.openxmlformats.org/officeDocument/2006/math" xmlns:a14="http://schemas.microsoft.com/office/drawing/2010/main" xmlns:ma14="http://schemas.microsoft.com/office/mac/drawingml/2011/main" val="1"/>
             </a:ext>
           </a:extLst>
         </p:spPr>
@@ -11463,7 +11463,7 @@
           </a:ln>
           <a:extLst>
             <a:ext uri="{C572A759-6A51-4108-AA02-DFA0A04FC94B}">
-              <ma14:wrappingTextBoxFlag xmlns:ma14="http://schemas.microsoft.com/office/mac/drawingml/2011/main" xmlns:a14="http://schemas.microsoft.com/office/drawing/2010/main" xmlns:m="http://schemas.openxmlformats.org/officeDocument/2006/math" xmlns="" val="1"/>
+              <ma14:wrappingTextBoxFlag xmlns="" xmlns:m="http://schemas.openxmlformats.org/officeDocument/2006/math" xmlns:a14="http://schemas.microsoft.com/office/drawing/2010/main" xmlns:ma14="http://schemas.microsoft.com/office/mac/drawingml/2011/main" val="1"/>
             </a:ext>
           </a:extLst>
         </p:spPr>
@@ -11823,7 +11823,7 @@
           </a:ln>
           <a:extLst>
             <a:ext uri="{C572A759-6A51-4108-AA02-DFA0A04FC94B}">
-              <ma14:wrappingTextBoxFlag xmlns:ma14="http://schemas.microsoft.com/office/mac/drawingml/2011/main" xmlns:a14="http://schemas.microsoft.com/office/drawing/2010/main" xmlns:m="http://schemas.openxmlformats.org/officeDocument/2006/math" xmlns="" val="1"/>
+              <ma14:wrappingTextBoxFlag xmlns="" xmlns:m="http://schemas.openxmlformats.org/officeDocument/2006/math" xmlns:a14="http://schemas.microsoft.com/office/drawing/2010/main" xmlns:ma14="http://schemas.microsoft.com/office/mac/drawingml/2011/main" val="1"/>
             </a:ext>
           </a:extLst>
         </p:spPr>
@@ -11858,7 +11858,7 @@
           </a:ln>
           <a:extLst>
             <a:ext uri="{C572A759-6A51-4108-AA02-DFA0A04FC94B}">
-              <ma14:wrappingTextBoxFlag xmlns:ma14="http://schemas.microsoft.com/office/mac/drawingml/2011/main" xmlns:a14="http://schemas.microsoft.com/office/drawing/2010/main" xmlns:m="http://schemas.openxmlformats.org/officeDocument/2006/math" xmlns="" val="1"/>
+              <ma14:wrappingTextBoxFlag xmlns="" xmlns:m="http://schemas.openxmlformats.org/officeDocument/2006/math" xmlns:a14="http://schemas.microsoft.com/office/drawing/2010/main" xmlns:ma14="http://schemas.microsoft.com/office/mac/drawingml/2011/main" val="1"/>
             </a:ext>
           </a:extLst>
         </p:spPr>
@@ -11905,7 +11905,7 @@
           </a:ln>
           <a:extLst>
             <a:ext uri="{C572A759-6A51-4108-AA02-DFA0A04FC94B}">
-              <ma14:wrappingTextBoxFlag xmlns:ma14="http://schemas.microsoft.com/office/mac/drawingml/2011/main" xmlns:a14="http://schemas.microsoft.com/office/drawing/2010/main" xmlns:m="http://schemas.openxmlformats.org/officeDocument/2006/math" xmlns="" val="1"/>
+              <ma14:wrappingTextBoxFlag xmlns="" xmlns:m="http://schemas.openxmlformats.org/officeDocument/2006/math" xmlns:a14="http://schemas.microsoft.com/office/drawing/2010/main" xmlns:ma14="http://schemas.microsoft.com/office/mac/drawingml/2011/main" val="1"/>
             </a:ext>
           </a:extLst>
         </p:spPr>
@@ -11952,7 +11952,7 @@
           </a:ln>
           <a:extLst>
             <a:ext uri="{C572A759-6A51-4108-AA02-DFA0A04FC94B}">
-              <ma14:wrappingTextBoxFlag xmlns:ma14="http://schemas.microsoft.com/office/mac/drawingml/2011/main" xmlns:a14="http://schemas.microsoft.com/office/drawing/2010/main" xmlns:m="http://schemas.openxmlformats.org/officeDocument/2006/math" xmlns="" val="1"/>
+              <ma14:wrappingTextBoxFlag xmlns="" xmlns:m="http://schemas.openxmlformats.org/officeDocument/2006/math" xmlns:a14="http://schemas.microsoft.com/office/drawing/2010/main" xmlns:ma14="http://schemas.microsoft.com/office/mac/drawingml/2011/main" val="1"/>
             </a:ext>
           </a:extLst>
         </p:spPr>
@@ -12340,7 +12340,7 @@
           </a:ln>
           <a:extLst>
             <a:ext uri="{C572A759-6A51-4108-AA02-DFA0A04FC94B}">
-              <ma14:wrappingTextBoxFlag xmlns:ma14="http://schemas.microsoft.com/office/mac/drawingml/2011/main" xmlns:a14="http://schemas.microsoft.com/office/drawing/2010/main" xmlns:m="http://schemas.openxmlformats.org/officeDocument/2006/math" xmlns="" val="1"/>
+              <ma14:wrappingTextBoxFlag xmlns="" xmlns:m="http://schemas.openxmlformats.org/officeDocument/2006/math" xmlns:a14="http://schemas.microsoft.com/office/drawing/2010/main" xmlns:ma14="http://schemas.microsoft.com/office/mac/drawingml/2011/main" val="1"/>
             </a:ext>
           </a:extLst>
         </p:spPr>
@@ -12386,7 +12386,7 @@
           </a:ln>
           <a:extLst>
             <a:ext uri="{C572A759-6A51-4108-AA02-DFA0A04FC94B}">
-              <ma14:wrappingTextBoxFlag xmlns:ma14="http://schemas.microsoft.com/office/mac/drawingml/2011/main" xmlns:a14="http://schemas.microsoft.com/office/drawing/2010/main" xmlns:m="http://schemas.openxmlformats.org/officeDocument/2006/math" xmlns="" val="1"/>
+              <ma14:wrappingTextBoxFlag xmlns="" xmlns:m="http://schemas.openxmlformats.org/officeDocument/2006/math" xmlns:a14="http://schemas.microsoft.com/office/drawing/2010/main" xmlns:ma14="http://schemas.microsoft.com/office/mac/drawingml/2011/main" val="1"/>
             </a:ext>
           </a:extLst>
         </p:spPr>
@@ -12432,7 +12432,7 @@
           </a:ln>
           <a:extLst>
             <a:ext uri="{C572A759-6A51-4108-AA02-DFA0A04FC94B}">
-              <ma14:wrappingTextBoxFlag xmlns:ma14="http://schemas.microsoft.com/office/mac/drawingml/2011/main" xmlns:a14="http://schemas.microsoft.com/office/drawing/2010/main" xmlns:m="http://schemas.openxmlformats.org/officeDocument/2006/math" xmlns="" val="1"/>
+              <ma14:wrappingTextBoxFlag xmlns="" xmlns:m="http://schemas.openxmlformats.org/officeDocument/2006/math" xmlns:a14="http://schemas.microsoft.com/office/drawing/2010/main" xmlns:ma14="http://schemas.microsoft.com/office/mac/drawingml/2011/main" val="1"/>
             </a:ext>
           </a:extLst>
         </p:spPr>
@@ -12478,7 +12478,7 @@
           </a:ln>
           <a:extLst>
             <a:ext uri="{C572A759-6A51-4108-AA02-DFA0A04FC94B}">
-              <ma14:wrappingTextBoxFlag xmlns:ma14="http://schemas.microsoft.com/office/mac/drawingml/2011/main" xmlns:a14="http://schemas.microsoft.com/office/drawing/2010/main" xmlns:m="http://schemas.openxmlformats.org/officeDocument/2006/math" xmlns="" val="1"/>
+              <ma14:wrappingTextBoxFlag xmlns="" xmlns:m="http://schemas.openxmlformats.org/officeDocument/2006/math" xmlns:a14="http://schemas.microsoft.com/office/drawing/2010/main" xmlns:ma14="http://schemas.microsoft.com/office/mac/drawingml/2011/main" val="1"/>
             </a:ext>
           </a:extLst>
         </p:spPr>
@@ -12524,7 +12524,7 @@
           </a:ln>
           <a:extLst>
             <a:ext uri="{C572A759-6A51-4108-AA02-DFA0A04FC94B}">
-              <ma14:wrappingTextBoxFlag xmlns:ma14="http://schemas.microsoft.com/office/mac/drawingml/2011/main" xmlns:a14="http://schemas.microsoft.com/office/drawing/2010/main" xmlns:m="http://schemas.openxmlformats.org/officeDocument/2006/math" xmlns="" val="1"/>
+              <ma14:wrappingTextBoxFlag xmlns="" xmlns:m="http://schemas.openxmlformats.org/officeDocument/2006/math" xmlns:a14="http://schemas.microsoft.com/office/drawing/2010/main" xmlns:ma14="http://schemas.microsoft.com/office/mac/drawingml/2011/main" val="1"/>
             </a:ext>
           </a:extLst>
         </p:spPr>
@@ -12570,7 +12570,7 @@
           </a:ln>
           <a:extLst>
             <a:ext uri="{C572A759-6A51-4108-AA02-DFA0A04FC94B}">
-              <ma14:wrappingTextBoxFlag xmlns:ma14="http://schemas.microsoft.com/office/mac/drawingml/2011/main" xmlns:a14="http://schemas.microsoft.com/office/drawing/2010/main" xmlns:m="http://schemas.openxmlformats.org/officeDocument/2006/math" xmlns="" val="1"/>
+              <ma14:wrappingTextBoxFlag xmlns="" xmlns:m="http://schemas.openxmlformats.org/officeDocument/2006/math" xmlns:a14="http://schemas.microsoft.com/office/drawing/2010/main" xmlns:ma14="http://schemas.microsoft.com/office/mac/drawingml/2011/main" val="1"/>
             </a:ext>
           </a:extLst>
         </p:spPr>
@@ -12642,7 +12642,7 @@
           </a:ln>
           <a:extLst>
             <a:ext uri="{C572A759-6A51-4108-AA02-DFA0A04FC94B}">
-              <ma14:wrappingTextBoxFlag xmlns:ma14="http://schemas.microsoft.com/office/mac/drawingml/2011/main" xmlns:a14="http://schemas.microsoft.com/office/drawing/2010/main" xmlns:m="http://schemas.openxmlformats.org/officeDocument/2006/math" xmlns="" val="1"/>
+              <ma14:wrappingTextBoxFlag xmlns="" xmlns:m="http://schemas.openxmlformats.org/officeDocument/2006/math" xmlns:a14="http://schemas.microsoft.com/office/drawing/2010/main" xmlns:ma14="http://schemas.microsoft.com/office/mac/drawingml/2011/main" val="1"/>
             </a:ext>
           </a:extLst>
         </p:spPr>
@@ -12714,7 +12714,7 @@
           </a:ln>
           <a:extLst>
             <a:ext uri="{C572A759-6A51-4108-AA02-DFA0A04FC94B}">
-              <ma14:wrappingTextBoxFlag xmlns:ma14="http://schemas.microsoft.com/office/mac/drawingml/2011/main" xmlns:a14="http://schemas.microsoft.com/office/drawing/2010/main" xmlns:m="http://schemas.openxmlformats.org/officeDocument/2006/math" xmlns="" val="1"/>
+              <ma14:wrappingTextBoxFlag xmlns="" xmlns:m="http://schemas.openxmlformats.org/officeDocument/2006/math" xmlns:a14="http://schemas.microsoft.com/office/drawing/2010/main" xmlns:ma14="http://schemas.microsoft.com/office/mac/drawingml/2011/main" val="1"/>
             </a:ext>
           </a:extLst>
         </p:spPr>
@@ -12786,7 +12786,7 @@
           </a:ln>
           <a:extLst>
             <a:ext uri="{C572A759-6A51-4108-AA02-DFA0A04FC94B}">
-              <ma14:wrappingTextBoxFlag xmlns:ma14="http://schemas.microsoft.com/office/mac/drawingml/2011/main" xmlns:a14="http://schemas.microsoft.com/office/drawing/2010/main" xmlns:m="http://schemas.openxmlformats.org/officeDocument/2006/math" xmlns="" val="1"/>
+              <ma14:wrappingTextBoxFlag xmlns="" xmlns:m="http://schemas.openxmlformats.org/officeDocument/2006/math" xmlns:a14="http://schemas.microsoft.com/office/drawing/2010/main" xmlns:ma14="http://schemas.microsoft.com/office/mac/drawingml/2011/main" val="1"/>
             </a:ext>
           </a:extLst>
         </p:spPr>
@@ -12901,7 +12901,7 @@
           </a:ln>
           <a:extLst>
             <a:ext uri="{C572A759-6A51-4108-AA02-DFA0A04FC94B}">
-              <ma14:wrappingTextBoxFlag xmlns:ma14="http://schemas.microsoft.com/office/mac/drawingml/2011/main" xmlns:a14="http://schemas.microsoft.com/office/drawing/2010/main" xmlns:m="http://schemas.openxmlformats.org/officeDocument/2006/math" xmlns="" val="1"/>
+              <ma14:wrappingTextBoxFlag xmlns="" xmlns:m="http://schemas.openxmlformats.org/officeDocument/2006/math" xmlns:a14="http://schemas.microsoft.com/office/drawing/2010/main" xmlns:ma14="http://schemas.microsoft.com/office/mac/drawingml/2011/main" val="1"/>
             </a:ext>
           </a:extLst>
         </p:spPr>
@@ -12978,7 +12978,7 @@
           </a:ln>
           <a:extLst>
             <a:ext uri="{C572A759-6A51-4108-AA02-DFA0A04FC94B}">
-              <ma14:wrappingTextBoxFlag xmlns:ma14="http://schemas.microsoft.com/office/mac/drawingml/2011/main" xmlns:a14="http://schemas.microsoft.com/office/drawing/2010/main" xmlns:m="http://schemas.openxmlformats.org/officeDocument/2006/math" xmlns="" val="1"/>
+              <ma14:wrappingTextBoxFlag xmlns="" xmlns:m="http://schemas.openxmlformats.org/officeDocument/2006/math" xmlns:a14="http://schemas.microsoft.com/office/drawing/2010/main" xmlns:ma14="http://schemas.microsoft.com/office/mac/drawingml/2011/main" val="1"/>
             </a:ext>
           </a:extLst>
         </p:spPr>
@@ -13026,7 +13026,7 @@
           </a:ln>
           <a:extLst>
             <a:ext uri="{C572A759-6A51-4108-AA02-DFA0A04FC94B}">
-              <ma14:wrappingTextBoxFlag xmlns:ma14="http://schemas.microsoft.com/office/mac/drawingml/2011/main" xmlns:a14="http://schemas.microsoft.com/office/drawing/2010/main" xmlns:m="http://schemas.openxmlformats.org/officeDocument/2006/math" xmlns="" val="1"/>
+              <ma14:wrappingTextBoxFlag xmlns="" xmlns:m="http://schemas.openxmlformats.org/officeDocument/2006/math" xmlns:a14="http://schemas.microsoft.com/office/drawing/2010/main" xmlns:ma14="http://schemas.microsoft.com/office/mac/drawingml/2011/main" val="1"/>
             </a:ext>
           </a:extLst>
         </p:spPr>
@@ -13071,7 +13071,7 @@
           </a:ln>
           <a:extLst>
             <a:ext uri="{C572A759-6A51-4108-AA02-DFA0A04FC94B}">
-              <ma14:wrappingTextBoxFlag xmlns:ma14="http://schemas.microsoft.com/office/mac/drawingml/2011/main" xmlns:a14="http://schemas.microsoft.com/office/drawing/2010/main" xmlns:m="http://schemas.openxmlformats.org/officeDocument/2006/math" xmlns="" val="1"/>
+              <ma14:wrappingTextBoxFlag xmlns="" xmlns:m="http://schemas.openxmlformats.org/officeDocument/2006/math" xmlns:a14="http://schemas.microsoft.com/office/drawing/2010/main" xmlns:ma14="http://schemas.microsoft.com/office/mac/drawingml/2011/main" val="1"/>
             </a:ext>
           </a:extLst>
         </p:spPr>
@@ -13116,7 +13116,7 @@
           </a:ln>
           <a:extLst>
             <a:ext uri="{C572A759-6A51-4108-AA02-DFA0A04FC94B}">
-              <ma14:wrappingTextBoxFlag xmlns:ma14="http://schemas.microsoft.com/office/mac/drawingml/2011/main" xmlns:a14="http://schemas.microsoft.com/office/drawing/2010/main" xmlns:m="http://schemas.openxmlformats.org/officeDocument/2006/math" xmlns="" val="1"/>
+              <ma14:wrappingTextBoxFlag xmlns="" xmlns:m="http://schemas.openxmlformats.org/officeDocument/2006/math" xmlns:a14="http://schemas.microsoft.com/office/drawing/2010/main" xmlns:ma14="http://schemas.microsoft.com/office/mac/drawingml/2011/main" val="1"/>
             </a:ext>
           </a:extLst>
         </p:spPr>
@@ -13158,7 +13158,7 @@
           </a:ln>
           <a:extLst>
             <a:ext uri="{C572A759-6A51-4108-AA02-DFA0A04FC94B}">
-              <ma14:wrappingTextBoxFlag xmlns:ma14="http://schemas.microsoft.com/office/mac/drawingml/2011/main" xmlns:a14="http://schemas.microsoft.com/office/drawing/2010/main" xmlns:m="http://schemas.openxmlformats.org/officeDocument/2006/math" xmlns="" val="1"/>
+              <ma14:wrappingTextBoxFlag xmlns="" xmlns:m="http://schemas.openxmlformats.org/officeDocument/2006/math" xmlns:a14="http://schemas.microsoft.com/office/drawing/2010/main" xmlns:ma14="http://schemas.microsoft.com/office/mac/drawingml/2011/main" val="1"/>
             </a:ext>
           </a:extLst>
         </p:spPr>
@@ -13492,7 +13492,7 @@
           </a:ln>
           <a:extLst>
             <a:ext uri="{C572A759-6A51-4108-AA02-DFA0A04FC94B}">
-              <ma14:wrappingTextBoxFlag xmlns:ma14="http://schemas.microsoft.com/office/mac/drawingml/2011/main" xmlns:a14="http://schemas.microsoft.com/office/drawing/2010/main" xmlns:m="http://schemas.openxmlformats.org/officeDocument/2006/math" xmlns="" val="1"/>
+              <ma14:wrappingTextBoxFlag xmlns="" xmlns:m="http://schemas.openxmlformats.org/officeDocument/2006/math" xmlns:a14="http://schemas.microsoft.com/office/drawing/2010/main" xmlns:ma14="http://schemas.microsoft.com/office/mac/drawingml/2011/main" val="1"/>
             </a:ext>
           </a:extLst>
         </p:spPr>
@@ -13628,7 +13628,7 @@
           </a:ln>
           <a:extLst>
             <a:ext uri="{C572A759-6A51-4108-AA02-DFA0A04FC94B}">
-              <ma14:wrappingTextBoxFlag xmlns:ma14="http://schemas.microsoft.com/office/mac/drawingml/2011/main" xmlns:a14="http://schemas.microsoft.com/office/drawing/2010/main" xmlns:m="http://schemas.openxmlformats.org/officeDocument/2006/math" xmlns="" val="1"/>
+              <ma14:wrappingTextBoxFlag xmlns="" xmlns:m="http://schemas.openxmlformats.org/officeDocument/2006/math" xmlns:a14="http://schemas.microsoft.com/office/drawing/2010/main" xmlns:ma14="http://schemas.microsoft.com/office/mac/drawingml/2011/main" val="1"/>
             </a:ext>
           </a:extLst>
         </p:spPr>
@@ -13969,7 +13969,7 @@
           </a:ln>
           <a:extLst>
             <a:ext uri="{C572A759-6A51-4108-AA02-DFA0A04FC94B}">
-              <ma14:wrappingTextBoxFlag xmlns:ma14="http://schemas.microsoft.com/office/mac/drawingml/2011/main" xmlns:a14="http://schemas.microsoft.com/office/drawing/2010/main" xmlns:m="http://schemas.openxmlformats.org/officeDocument/2006/math" xmlns="" val="1"/>
+              <ma14:wrappingTextBoxFlag xmlns="" xmlns:m="http://schemas.openxmlformats.org/officeDocument/2006/math" xmlns:a14="http://schemas.microsoft.com/office/drawing/2010/main" xmlns:ma14="http://schemas.microsoft.com/office/mac/drawingml/2011/main" val="1"/>
             </a:ext>
           </a:extLst>
         </p:spPr>
@@ -14158,7 +14158,7 @@
           </a:ln>
           <a:extLst>
             <a:ext uri="{C572A759-6A51-4108-AA02-DFA0A04FC94B}">
-              <ma14:wrappingTextBoxFlag xmlns:ma14="http://schemas.microsoft.com/office/mac/drawingml/2011/main" xmlns:a14="http://schemas.microsoft.com/office/drawing/2010/main" xmlns:m="http://schemas.openxmlformats.org/officeDocument/2006/math" xmlns="" val="1"/>
+              <ma14:wrappingTextBoxFlag xmlns="" xmlns:m="http://schemas.openxmlformats.org/officeDocument/2006/math" xmlns:a14="http://schemas.microsoft.com/office/drawing/2010/main" xmlns:ma14="http://schemas.microsoft.com/office/mac/drawingml/2011/main" val="1"/>
             </a:ext>
           </a:extLst>
         </p:spPr>
@@ -14499,7 +14499,7 @@
           </a:ln>
           <a:extLst>
             <a:ext uri="{C572A759-6A51-4108-AA02-DFA0A04FC94B}">
-              <ma14:wrappingTextBoxFlag xmlns:ma14="http://schemas.microsoft.com/office/mac/drawingml/2011/main" xmlns:a14="http://schemas.microsoft.com/office/drawing/2010/main" xmlns:m="http://schemas.openxmlformats.org/officeDocument/2006/math" xmlns="" val="1"/>
+              <ma14:wrappingTextBoxFlag xmlns="" xmlns:m="http://schemas.openxmlformats.org/officeDocument/2006/math" xmlns:a14="http://schemas.microsoft.com/office/drawing/2010/main" xmlns:ma14="http://schemas.microsoft.com/office/mac/drawingml/2011/main" val="1"/>
             </a:ext>
           </a:extLst>
         </p:spPr>
@@ -14662,7 +14662,7 @@
           </a:ln>
           <a:extLst>
             <a:ext uri="{C572A759-6A51-4108-AA02-DFA0A04FC94B}">
-              <ma14:wrappingTextBoxFlag xmlns:ma14="http://schemas.microsoft.com/office/mac/drawingml/2011/main" xmlns:a14="http://schemas.microsoft.com/office/drawing/2010/main" xmlns:m="http://schemas.openxmlformats.org/officeDocument/2006/math" xmlns="" val="1"/>
+              <ma14:wrappingTextBoxFlag xmlns="" xmlns:m="http://schemas.openxmlformats.org/officeDocument/2006/math" xmlns:a14="http://schemas.microsoft.com/office/drawing/2010/main" xmlns:ma14="http://schemas.microsoft.com/office/mac/drawingml/2011/main" val="1"/>
             </a:ext>
           </a:extLst>
         </p:spPr>
@@ -14894,7 +14894,7 @@
           </a:ln>
           <a:extLst>
             <a:ext uri="{C572A759-6A51-4108-AA02-DFA0A04FC94B}">
-              <ma14:wrappingTextBoxFlag xmlns:ma14="http://schemas.microsoft.com/office/mac/drawingml/2011/main" xmlns:a14="http://schemas.microsoft.com/office/drawing/2010/main" xmlns:m="http://schemas.openxmlformats.org/officeDocument/2006/math" xmlns="" val="1"/>
+              <ma14:wrappingTextBoxFlag xmlns="" xmlns:m="http://schemas.openxmlformats.org/officeDocument/2006/math" xmlns:a14="http://schemas.microsoft.com/office/drawing/2010/main" xmlns:ma14="http://schemas.microsoft.com/office/mac/drawingml/2011/main" val="1"/>
             </a:ext>
           </a:extLst>
         </p:spPr>
@@ -15235,7 +15235,7 @@
           </a:ln>
           <a:extLst>
             <a:ext uri="{C572A759-6A51-4108-AA02-DFA0A04FC94B}">
-              <ma14:wrappingTextBoxFlag xmlns:ma14="http://schemas.microsoft.com/office/mac/drawingml/2011/main" xmlns:a14="http://schemas.microsoft.com/office/drawing/2010/main" xmlns:m="http://schemas.openxmlformats.org/officeDocument/2006/math" xmlns="" val="1"/>
+              <ma14:wrappingTextBoxFlag xmlns="" xmlns:m="http://schemas.openxmlformats.org/officeDocument/2006/math" xmlns:a14="http://schemas.microsoft.com/office/drawing/2010/main" xmlns:ma14="http://schemas.microsoft.com/office/mac/drawingml/2011/main" val="1"/>
             </a:ext>
           </a:extLst>
         </p:spPr>
@@ -15398,7 +15398,7 @@
           </a:ln>
           <a:extLst>
             <a:ext uri="{C572A759-6A51-4108-AA02-DFA0A04FC94B}">
-              <ma14:wrappingTextBoxFlag xmlns:ma14="http://schemas.microsoft.com/office/mac/drawingml/2011/main" xmlns:a14="http://schemas.microsoft.com/office/drawing/2010/main" xmlns:m="http://schemas.openxmlformats.org/officeDocument/2006/math" xmlns="" val="1"/>
+              <ma14:wrappingTextBoxFlag xmlns="" xmlns:m="http://schemas.openxmlformats.org/officeDocument/2006/math" xmlns:a14="http://schemas.microsoft.com/office/drawing/2010/main" xmlns:ma14="http://schemas.microsoft.com/office/mac/drawingml/2011/main" val="1"/>
             </a:ext>
           </a:extLst>
         </p:spPr>
@@ -15604,7 +15604,7 @@
           </a:ln>
           <a:extLst>
             <a:ext uri="{C572A759-6A51-4108-AA02-DFA0A04FC94B}">
-              <ma14:wrappingTextBoxFlag xmlns:ma14="http://schemas.microsoft.com/office/mac/drawingml/2011/main" xmlns:a14="http://schemas.microsoft.com/office/drawing/2010/main" xmlns:m="http://schemas.openxmlformats.org/officeDocument/2006/math" xmlns="" val="1"/>
+              <ma14:wrappingTextBoxFlag xmlns="" xmlns:m="http://schemas.openxmlformats.org/officeDocument/2006/math" xmlns:a14="http://schemas.microsoft.com/office/drawing/2010/main" xmlns:ma14="http://schemas.microsoft.com/office/mac/drawingml/2011/main" val="1"/>
             </a:ext>
           </a:extLst>
         </p:spPr>
@@ -15847,7 +15847,7 @@
           </a:ln>
           <a:extLst>
             <a:ext uri="{C572A759-6A51-4108-AA02-DFA0A04FC94B}">
-              <ma14:wrappingTextBoxFlag xmlns:ma14="http://schemas.microsoft.com/office/mac/drawingml/2011/main" xmlns:a14="http://schemas.microsoft.com/office/drawing/2010/main" xmlns:m="http://schemas.openxmlformats.org/officeDocument/2006/math" xmlns="" val="1"/>
+              <ma14:wrappingTextBoxFlag xmlns="" xmlns:m="http://schemas.openxmlformats.org/officeDocument/2006/math" xmlns:a14="http://schemas.microsoft.com/office/drawing/2010/main" xmlns:ma14="http://schemas.microsoft.com/office/mac/drawingml/2011/main" val="1"/>
             </a:ext>
           </a:extLst>
         </p:spPr>
@@ -17404,7 +17404,7 @@
           </a:ln>
           <a:extLst>
             <a:ext uri="{C572A759-6A51-4108-AA02-DFA0A04FC94B}">
-              <ma14:wrappingTextBoxFlag xmlns:ma14="http://schemas.microsoft.com/office/mac/drawingml/2011/main" xmlns:a14="http://schemas.microsoft.com/office/drawing/2010/main" xmlns:m="http://schemas.openxmlformats.org/officeDocument/2006/math" xmlns="" val="1"/>
+              <ma14:wrappingTextBoxFlag xmlns="" xmlns:m="http://schemas.openxmlformats.org/officeDocument/2006/math" xmlns:a14="http://schemas.microsoft.com/office/drawing/2010/main" xmlns:ma14="http://schemas.microsoft.com/office/mac/drawingml/2011/main" val="1"/>
             </a:ext>
           </a:extLst>
         </p:spPr>
@@ -18307,7 +18307,7 @@
           </a:ln>
           <a:extLst>
             <a:ext uri="{C572A759-6A51-4108-AA02-DFA0A04FC94B}">
-              <ma14:wrappingTextBoxFlag xmlns:ma14="http://schemas.microsoft.com/office/mac/drawingml/2011/main" xmlns:a14="http://schemas.microsoft.com/office/drawing/2010/main" xmlns:m="http://schemas.openxmlformats.org/officeDocument/2006/math" xmlns="" val="1"/>
+              <ma14:wrappingTextBoxFlag xmlns="" xmlns:m="http://schemas.openxmlformats.org/officeDocument/2006/math" xmlns:a14="http://schemas.microsoft.com/office/drawing/2010/main" xmlns:ma14="http://schemas.microsoft.com/office/mac/drawingml/2011/main" val="1"/>
             </a:ext>
           </a:extLst>
         </p:spPr>
@@ -19194,7 +19194,7 @@
           </a:ln>
           <a:extLst>
             <a:ext uri="{C572A759-6A51-4108-AA02-DFA0A04FC94B}">
-              <ma14:wrappingTextBoxFlag xmlns:ma14="http://schemas.microsoft.com/office/mac/drawingml/2011/main" xmlns:a14="http://schemas.microsoft.com/office/drawing/2010/main" xmlns:m="http://schemas.openxmlformats.org/officeDocument/2006/math" xmlns="" val="1"/>
+              <ma14:wrappingTextBoxFlag xmlns="" xmlns:m="http://schemas.openxmlformats.org/officeDocument/2006/math" xmlns:a14="http://schemas.microsoft.com/office/drawing/2010/main" xmlns:ma14="http://schemas.microsoft.com/office/mac/drawingml/2011/main" val="1"/>
             </a:ext>
           </a:extLst>
         </p:spPr>
@@ -19256,7 +19256,7 @@
           </a:ln>
           <a:extLst>
             <a:ext uri="{C572A759-6A51-4108-AA02-DFA0A04FC94B}">
-              <ma14:wrappingTextBoxFlag xmlns:ma14="http://schemas.microsoft.com/office/mac/drawingml/2011/main" xmlns:a14="http://schemas.microsoft.com/office/drawing/2010/main" xmlns:m="http://schemas.openxmlformats.org/officeDocument/2006/math" xmlns="" val="1"/>
+              <ma14:wrappingTextBoxFlag xmlns="" xmlns:m="http://schemas.openxmlformats.org/officeDocument/2006/math" xmlns:a14="http://schemas.microsoft.com/office/drawing/2010/main" xmlns:ma14="http://schemas.microsoft.com/office/mac/drawingml/2011/main" val="1"/>
             </a:ext>
           </a:extLst>
         </p:spPr>
@@ -22488,7 +22488,7 @@
           </a:ln>
           <a:extLst>
             <a:ext uri="{C572A759-6A51-4108-AA02-DFA0A04FC94B}">
-              <ma14:wrappingTextBoxFlag xmlns:ma14="http://schemas.microsoft.com/office/mac/drawingml/2011/main" xmlns:a14="http://schemas.microsoft.com/office/drawing/2010/main" xmlns:m="http://schemas.openxmlformats.org/officeDocument/2006/math" xmlns="" val="1"/>
+              <ma14:wrappingTextBoxFlag xmlns="" xmlns:m="http://schemas.openxmlformats.org/officeDocument/2006/math" xmlns:a14="http://schemas.microsoft.com/office/drawing/2010/main" xmlns:ma14="http://schemas.microsoft.com/office/mac/drawingml/2011/main" val="1"/>
             </a:ext>
           </a:extLst>
         </p:spPr>
@@ -22600,7 +22600,7 @@
           </a:ln>
           <a:extLst>
             <a:ext uri="{C572A759-6A51-4108-AA02-DFA0A04FC94B}">
-              <ma14:wrappingTextBoxFlag xmlns:ma14="http://schemas.microsoft.com/office/mac/drawingml/2011/main" xmlns:a14="http://schemas.microsoft.com/office/drawing/2010/main" xmlns:m="http://schemas.openxmlformats.org/officeDocument/2006/math" xmlns="" val="1"/>
+              <ma14:wrappingTextBoxFlag xmlns="" xmlns:m="http://schemas.openxmlformats.org/officeDocument/2006/math" xmlns:a14="http://schemas.microsoft.com/office/drawing/2010/main" xmlns:ma14="http://schemas.microsoft.com/office/mac/drawingml/2011/main" val="1"/>
             </a:ext>
           </a:extLst>
         </p:spPr>
@@ -22915,7 +22915,7 @@
         </p:nvSpPr>
         <p:spPr>
           <a:xfrm>
-            <a:off x="728025" y="2672418"/>
+            <a:off x="699797" y="1917341"/>
             <a:ext cx="6138119" cy="7271843"/>
           </a:xfrm>
           <a:prstGeom prst="rect">
@@ -22924,17 +22924,25 @@
         </p:spPr>
         <p:txBody>
           <a:bodyPr anchor="t">
-            <a:normAutofit/>
+            <a:normAutofit fontScale="92500"/>
           </a:bodyPr>
           <a:lstStyle/>
           <a:p>
-            <a:pPr marL="0" indent="0">
+            <a:pPr>
               <a:buSzTx/>
-              <a:buNone/>
-            </a:pPr>
-            <a:r>
-              <a:rPr lang="en-US" i="1" dirty="0"/>
+            </a:pPr>
+            <a:r>
+              <a:rPr lang="en-US" dirty="0"/>
               <a:t>lambda functions are a way to abstract a function reference</a:t>
+            </a:r>
+          </a:p>
+          <a:p>
+            <a:pPr>
+              <a:buSzTx/>
+            </a:pPr>
+            <a:r>
+              <a:rPr lang="en-US" dirty="0"/>
+              <a:t>multiple possible parameters and single expression as function body</a:t>
             </a:r>
           </a:p>
           <a:p>
@@ -22948,7 +22956,15 @@
                   <a:srgbClr val="FF0000"/>
                 </a:solidFill>
               </a:rPr>
-              <a:t>lambda arguments: expression</a:t>
+              <a:t>lambda </a:t>
+            </a:r>
+            <a:r>
+              <a:rPr lang="en-US" b="1" dirty="0">
+                <a:solidFill>
+                  <a:schemeClr val="tx1"/>
+                </a:solidFill>
+              </a:rPr>
+              <a:t>parameters: expression</a:t>
             </a:r>
           </a:p>
           <a:p>
@@ -23911,7 +23927,7 @@
         </p:nvSpPr>
         <p:spPr>
           <a:xfrm>
-            <a:off x="755660" y="2463874"/>
+            <a:off x="755660" y="2144898"/>
             <a:ext cx="6138119" cy="7271843"/>
           </a:xfrm>
           <a:prstGeom prst="rect">
@@ -23920,17 +23936,25 @@
         </p:spPr>
         <p:txBody>
           <a:bodyPr anchor="t">
-            <a:normAutofit/>
+            <a:normAutofit fontScale="92500"/>
           </a:bodyPr>
           <a:lstStyle/>
           <a:p>
-            <a:pPr marL="0" indent="0">
+            <a:pPr>
               <a:buSzTx/>
-              <a:buNone/>
-            </a:pPr>
-            <a:r>
-              <a:rPr lang="en-US" i="1" dirty="0"/>
+            </a:pPr>
+            <a:r>
+              <a:rPr lang="en-US" dirty="0"/>
               <a:t>lambda functions are a way to abstract a function reference</a:t>
+            </a:r>
+          </a:p>
+          <a:p>
+            <a:pPr>
+              <a:buSzTx/>
+            </a:pPr>
+            <a:r>
+              <a:rPr lang="en-US" dirty="0"/>
+              <a:t>multiple possible parameters and single expression as function body</a:t>
             </a:r>
           </a:p>
           <a:p>
@@ -23944,7 +23968,15 @@
                   <a:srgbClr val="FF0000"/>
                 </a:solidFill>
               </a:rPr>
-              <a:t>lambda arguments: expression</a:t>
+              <a:t>lambda </a:t>
+            </a:r>
+            <a:r>
+              <a:rPr lang="en-US" b="1" dirty="0">
+                <a:solidFill>
+                  <a:schemeClr val="tx1"/>
+                </a:solidFill>
+              </a:rPr>
+              <a:t>parameters: expression</a:t>
             </a:r>
           </a:p>
           <a:p>
@@ -25011,7 +25043,7 @@
           </a:ln>
           <a:extLst>
             <a:ext uri="{C572A759-6A51-4108-AA02-DFA0A04FC94B}">
-              <ma14:wrappingTextBoxFlag xmlns:ma14="http://schemas.microsoft.com/office/mac/drawingml/2011/main" xmlns:a14="http://schemas.microsoft.com/office/drawing/2010/main" xmlns:m="http://schemas.openxmlformats.org/officeDocument/2006/math" xmlns="" val="1"/>
+              <ma14:wrappingTextBoxFlag xmlns="" xmlns:m="http://schemas.openxmlformats.org/officeDocument/2006/math" xmlns:a14="http://schemas.microsoft.com/office/drawing/2010/main" xmlns:ma14="http://schemas.microsoft.com/office/mac/drawingml/2011/main" val="1"/>
             </a:ext>
           </a:extLst>
         </p:spPr>
@@ -25355,7 +25387,7 @@
           </a:ln>
           <a:extLst>
             <a:ext uri="{C572A759-6A51-4108-AA02-DFA0A04FC94B}">
-              <ma14:wrappingTextBoxFlag xmlns:ma14="http://schemas.microsoft.com/office/mac/drawingml/2011/main" xmlns:a14="http://schemas.microsoft.com/office/drawing/2010/main" xmlns:m="http://schemas.openxmlformats.org/officeDocument/2006/math" xmlns="" val="1"/>
+              <ma14:wrappingTextBoxFlag xmlns="" xmlns:m="http://schemas.openxmlformats.org/officeDocument/2006/math" xmlns:a14="http://schemas.microsoft.com/office/drawing/2010/main" xmlns:ma14="http://schemas.microsoft.com/office/mac/drawingml/2011/main" val="1"/>
             </a:ext>
           </a:extLst>
         </p:spPr>
@@ -25443,7 +25475,7 @@
           </a:ln>
           <a:extLst>
             <a:ext uri="{C572A759-6A51-4108-AA02-DFA0A04FC94B}">
-              <ma14:wrappingTextBoxFlag xmlns:ma14="http://schemas.microsoft.com/office/mac/drawingml/2011/main" xmlns:a14="http://schemas.microsoft.com/office/drawing/2010/main" xmlns:m="http://schemas.openxmlformats.org/officeDocument/2006/math" xmlns="" val="1"/>
+              <ma14:wrappingTextBoxFlag xmlns="" xmlns:m="http://schemas.openxmlformats.org/officeDocument/2006/math" xmlns:a14="http://schemas.microsoft.com/office/drawing/2010/main" xmlns:ma14="http://schemas.microsoft.com/office/mac/drawingml/2011/main" val="1"/>
             </a:ext>
           </a:extLst>
         </p:spPr>
@@ -25831,7 +25863,7 @@
           </a:ln>
           <a:extLst>
             <a:ext uri="{C572A759-6A51-4108-AA02-DFA0A04FC94B}">
-              <ma14:wrappingTextBoxFlag xmlns:ma14="http://schemas.microsoft.com/office/mac/drawingml/2011/main" xmlns:a14="http://schemas.microsoft.com/office/drawing/2010/main" xmlns:m="http://schemas.openxmlformats.org/officeDocument/2006/math" xmlns="" val="1"/>
+              <ma14:wrappingTextBoxFlag xmlns="" xmlns:m="http://schemas.openxmlformats.org/officeDocument/2006/math" xmlns:a14="http://schemas.microsoft.com/office/drawing/2010/main" xmlns:ma14="http://schemas.microsoft.com/office/mac/drawingml/2011/main" val="1"/>
             </a:ext>
           </a:extLst>
         </p:spPr>
@@ -25866,7 +25898,7 @@
           </a:ln>
           <a:extLst>
             <a:ext uri="{C572A759-6A51-4108-AA02-DFA0A04FC94B}">
-              <ma14:wrappingTextBoxFlag xmlns:ma14="http://schemas.microsoft.com/office/mac/drawingml/2011/main" xmlns:a14="http://schemas.microsoft.com/office/drawing/2010/main" xmlns:m="http://schemas.openxmlformats.org/officeDocument/2006/math" xmlns="" val="1"/>
+              <ma14:wrappingTextBoxFlag xmlns="" xmlns:m="http://schemas.openxmlformats.org/officeDocument/2006/math" xmlns:a14="http://schemas.microsoft.com/office/drawing/2010/main" xmlns:ma14="http://schemas.microsoft.com/office/mac/drawingml/2011/main" val="1"/>
             </a:ext>
           </a:extLst>
         </p:spPr>
@@ -25913,7 +25945,7 @@
           </a:ln>
           <a:extLst>
             <a:ext uri="{C572A759-6A51-4108-AA02-DFA0A04FC94B}">
-              <ma14:wrappingTextBoxFlag xmlns:ma14="http://schemas.microsoft.com/office/mac/drawingml/2011/main" xmlns:a14="http://schemas.microsoft.com/office/drawing/2010/main" xmlns:m="http://schemas.openxmlformats.org/officeDocument/2006/math" xmlns="" val="1"/>
+              <ma14:wrappingTextBoxFlag xmlns="" xmlns:m="http://schemas.openxmlformats.org/officeDocument/2006/math" xmlns:a14="http://schemas.microsoft.com/office/drawing/2010/main" xmlns:ma14="http://schemas.microsoft.com/office/mac/drawingml/2011/main" val="1"/>
             </a:ext>
           </a:extLst>
         </p:spPr>
@@ -26029,7 +26061,7 @@
           </a:ln>
           <a:extLst>
             <a:ext uri="{C572A759-6A51-4108-AA02-DFA0A04FC94B}">
-              <ma14:wrappingTextBoxFlag xmlns:ma14="http://schemas.microsoft.com/office/mac/drawingml/2011/main" xmlns:a14="http://schemas.microsoft.com/office/drawing/2010/main" xmlns:m="http://schemas.openxmlformats.org/officeDocument/2006/math" xmlns="" val="1"/>
+              <ma14:wrappingTextBoxFlag xmlns="" xmlns:m="http://schemas.openxmlformats.org/officeDocument/2006/math" xmlns:a14="http://schemas.microsoft.com/office/drawing/2010/main" xmlns:ma14="http://schemas.microsoft.com/office/mac/drawingml/2011/main" val="1"/>
             </a:ext>
           </a:extLst>
         </p:spPr>
@@ -26064,7 +26096,7 @@
           </a:ln>
           <a:extLst>
             <a:ext uri="{C572A759-6A51-4108-AA02-DFA0A04FC94B}">
-              <ma14:wrappingTextBoxFlag xmlns:ma14="http://schemas.microsoft.com/office/mac/drawingml/2011/main" xmlns:a14="http://schemas.microsoft.com/office/drawing/2010/main" xmlns:m="http://schemas.openxmlformats.org/officeDocument/2006/math" xmlns="" val="1"/>
+              <ma14:wrappingTextBoxFlag xmlns="" xmlns:m="http://schemas.openxmlformats.org/officeDocument/2006/math" xmlns:a14="http://schemas.microsoft.com/office/drawing/2010/main" xmlns:ma14="http://schemas.microsoft.com/office/mac/drawingml/2011/main" val="1"/>
             </a:ext>
           </a:extLst>
         </p:spPr>
@@ -26111,7 +26143,7 @@
           </a:ln>
           <a:extLst>
             <a:ext uri="{C572A759-6A51-4108-AA02-DFA0A04FC94B}">
-              <ma14:wrappingTextBoxFlag xmlns:ma14="http://schemas.microsoft.com/office/mac/drawingml/2011/main" xmlns:a14="http://schemas.microsoft.com/office/drawing/2010/main" xmlns:m="http://schemas.openxmlformats.org/officeDocument/2006/math" xmlns="" val="1"/>
+              <ma14:wrappingTextBoxFlag xmlns="" xmlns:m="http://schemas.openxmlformats.org/officeDocument/2006/math" xmlns:a14="http://schemas.microsoft.com/office/drawing/2010/main" xmlns:ma14="http://schemas.microsoft.com/office/mac/drawingml/2011/main" val="1"/>
             </a:ext>
           </a:extLst>
         </p:spPr>
@@ -26158,7 +26190,7 @@
           </a:ln>
           <a:extLst>
             <a:ext uri="{C572A759-6A51-4108-AA02-DFA0A04FC94B}">
-              <ma14:wrappingTextBoxFlag xmlns:ma14="http://schemas.microsoft.com/office/mac/drawingml/2011/main" xmlns:a14="http://schemas.microsoft.com/office/drawing/2010/main" xmlns:m="http://schemas.openxmlformats.org/officeDocument/2006/math" xmlns="" val="1"/>
+              <ma14:wrappingTextBoxFlag xmlns="" xmlns:m="http://schemas.openxmlformats.org/officeDocument/2006/math" xmlns:a14="http://schemas.microsoft.com/office/drawing/2010/main" xmlns:ma14="http://schemas.microsoft.com/office/mac/drawingml/2011/main" val="1"/>
             </a:ext>
           </a:extLst>
         </p:spPr>
@@ -26546,7 +26578,7 @@
           </a:ln>
           <a:extLst>
             <a:ext uri="{C572A759-6A51-4108-AA02-DFA0A04FC94B}">
-              <ma14:wrappingTextBoxFlag xmlns:ma14="http://schemas.microsoft.com/office/mac/drawingml/2011/main" xmlns:a14="http://schemas.microsoft.com/office/drawing/2010/main" xmlns:m="http://schemas.openxmlformats.org/officeDocument/2006/math" xmlns="" val="1"/>
+              <ma14:wrappingTextBoxFlag xmlns="" xmlns:m="http://schemas.openxmlformats.org/officeDocument/2006/math" xmlns:a14="http://schemas.microsoft.com/office/drawing/2010/main" xmlns:ma14="http://schemas.microsoft.com/office/mac/drawingml/2011/main" val="1"/>
             </a:ext>
           </a:extLst>
         </p:spPr>
@@ -26592,7 +26624,7 @@
           </a:ln>
           <a:extLst>
             <a:ext uri="{C572A759-6A51-4108-AA02-DFA0A04FC94B}">
-              <ma14:wrappingTextBoxFlag xmlns:ma14="http://schemas.microsoft.com/office/mac/drawingml/2011/main" xmlns:a14="http://schemas.microsoft.com/office/drawing/2010/main" xmlns:m="http://schemas.openxmlformats.org/officeDocument/2006/math" xmlns="" val="1"/>
+              <ma14:wrappingTextBoxFlag xmlns="" xmlns:m="http://schemas.openxmlformats.org/officeDocument/2006/math" xmlns:a14="http://schemas.microsoft.com/office/drawing/2010/main" xmlns:ma14="http://schemas.microsoft.com/office/mac/drawingml/2011/main" val="1"/>
             </a:ext>
           </a:extLst>
         </p:spPr>
@@ -26710,7 +26742,7 @@
           </a:ln>
           <a:extLst>
             <a:ext uri="{C572A759-6A51-4108-AA02-DFA0A04FC94B}">
-              <ma14:wrappingTextBoxFlag xmlns:ma14="http://schemas.microsoft.com/office/mac/drawingml/2011/main" xmlns:a14="http://schemas.microsoft.com/office/drawing/2010/main" xmlns:m="http://schemas.openxmlformats.org/officeDocument/2006/math" xmlns="" val="1"/>
+              <ma14:wrappingTextBoxFlag xmlns="" xmlns:m="http://schemas.openxmlformats.org/officeDocument/2006/math" xmlns:a14="http://schemas.microsoft.com/office/drawing/2010/main" xmlns:ma14="http://schemas.microsoft.com/office/mac/drawingml/2011/main" val="1"/>
             </a:ext>
           </a:extLst>
         </p:spPr>
@@ -26755,7 +26787,7 @@
           </a:ln>
           <a:extLst>
             <a:ext uri="{C572A759-6A51-4108-AA02-DFA0A04FC94B}">
-              <ma14:wrappingTextBoxFlag xmlns:ma14="http://schemas.microsoft.com/office/mac/drawingml/2011/main" xmlns:a14="http://schemas.microsoft.com/office/drawing/2010/main" xmlns:m="http://schemas.openxmlformats.org/officeDocument/2006/math" xmlns="" val="1"/>
+              <ma14:wrappingTextBoxFlag xmlns="" xmlns:m="http://schemas.openxmlformats.org/officeDocument/2006/math" xmlns:a14="http://schemas.microsoft.com/office/drawing/2010/main" xmlns:ma14="http://schemas.microsoft.com/office/mac/drawingml/2011/main" val="1"/>
             </a:ext>
           </a:extLst>
         </p:spPr>
@@ -26800,7 +26832,7 @@
           </a:ln>
           <a:extLst>
             <a:ext uri="{C572A759-6A51-4108-AA02-DFA0A04FC94B}">
-              <ma14:wrappingTextBoxFlag xmlns:ma14="http://schemas.microsoft.com/office/mac/drawingml/2011/main" xmlns:a14="http://schemas.microsoft.com/office/drawing/2010/main" xmlns:m="http://schemas.openxmlformats.org/officeDocument/2006/math" xmlns="" val="1"/>
+              <ma14:wrappingTextBoxFlag xmlns="" xmlns:m="http://schemas.openxmlformats.org/officeDocument/2006/math" xmlns:a14="http://schemas.microsoft.com/office/drawing/2010/main" xmlns:ma14="http://schemas.microsoft.com/office/mac/drawingml/2011/main" val="1"/>
             </a:ext>
           </a:extLst>
         </p:spPr>
@@ -26927,7 +26959,7 @@
           </a:ln>
           <a:extLst>
             <a:ext uri="{C572A759-6A51-4108-AA02-DFA0A04FC94B}">
-              <ma14:wrappingTextBoxFlag xmlns:ma14="http://schemas.microsoft.com/office/mac/drawingml/2011/main" xmlns:a14="http://schemas.microsoft.com/office/drawing/2010/main" xmlns:m="http://schemas.openxmlformats.org/officeDocument/2006/math" xmlns="" val="1"/>
+              <ma14:wrappingTextBoxFlag xmlns="" xmlns:m="http://schemas.openxmlformats.org/officeDocument/2006/math" xmlns:a14="http://schemas.microsoft.com/office/drawing/2010/main" xmlns:ma14="http://schemas.microsoft.com/office/mac/drawingml/2011/main" val="1"/>
             </a:ext>
           </a:extLst>
         </p:spPr>
@@ -26962,7 +26994,7 @@
           </a:ln>
           <a:extLst>
             <a:ext uri="{C572A759-6A51-4108-AA02-DFA0A04FC94B}">
-              <ma14:wrappingTextBoxFlag xmlns:ma14="http://schemas.microsoft.com/office/mac/drawingml/2011/main" xmlns:a14="http://schemas.microsoft.com/office/drawing/2010/main" xmlns:m="http://schemas.openxmlformats.org/officeDocument/2006/math" xmlns="" val="1"/>
+              <ma14:wrappingTextBoxFlag xmlns="" xmlns:m="http://schemas.openxmlformats.org/officeDocument/2006/math" xmlns:a14="http://schemas.microsoft.com/office/drawing/2010/main" xmlns:ma14="http://schemas.microsoft.com/office/mac/drawingml/2011/main" val="1"/>
             </a:ext>
           </a:extLst>
         </p:spPr>
@@ -27009,7 +27041,7 @@
           </a:ln>
           <a:extLst>
             <a:ext uri="{C572A759-6A51-4108-AA02-DFA0A04FC94B}">
-              <ma14:wrappingTextBoxFlag xmlns:ma14="http://schemas.microsoft.com/office/mac/drawingml/2011/main" xmlns:a14="http://schemas.microsoft.com/office/drawing/2010/main" xmlns:m="http://schemas.openxmlformats.org/officeDocument/2006/math" xmlns="" val="1"/>
+              <ma14:wrappingTextBoxFlag xmlns="" xmlns:m="http://schemas.openxmlformats.org/officeDocument/2006/math" xmlns:a14="http://schemas.microsoft.com/office/drawing/2010/main" xmlns:ma14="http://schemas.microsoft.com/office/mac/drawingml/2011/main" val="1"/>
             </a:ext>
           </a:extLst>
         </p:spPr>
@@ -27056,7 +27088,7 @@
           </a:ln>
           <a:extLst>
             <a:ext uri="{C572A759-6A51-4108-AA02-DFA0A04FC94B}">
-              <ma14:wrappingTextBoxFlag xmlns:ma14="http://schemas.microsoft.com/office/mac/drawingml/2011/main" xmlns:a14="http://schemas.microsoft.com/office/drawing/2010/main" xmlns:m="http://schemas.openxmlformats.org/officeDocument/2006/math" xmlns="" val="1"/>
+              <ma14:wrappingTextBoxFlag xmlns="" xmlns:m="http://schemas.openxmlformats.org/officeDocument/2006/math" xmlns:a14="http://schemas.microsoft.com/office/drawing/2010/main" xmlns:ma14="http://schemas.microsoft.com/office/mac/drawingml/2011/main" val="1"/>
             </a:ext>
           </a:extLst>
         </p:spPr>
@@ -27444,7 +27476,7 @@
           </a:ln>
           <a:extLst>
             <a:ext uri="{C572A759-6A51-4108-AA02-DFA0A04FC94B}">
-              <ma14:wrappingTextBoxFlag xmlns:ma14="http://schemas.microsoft.com/office/mac/drawingml/2011/main" xmlns:a14="http://schemas.microsoft.com/office/drawing/2010/main" xmlns:m="http://schemas.openxmlformats.org/officeDocument/2006/math" xmlns="" val="1"/>
+              <ma14:wrappingTextBoxFlag xmlns="" xmlns:m="http://schemas.openxmlformats.org/officeDocument/2006/math" xmlns:a14="http://schemas.microsoft.com/office/drawing/2010/main" xmlns:ma14="http://schemas.microsoft.com/office/mac/drawingml/2011/main" val="1"/>
             </a:ext>
           </a:extLst>
         </p:spPr>
@@ -27490,7 +27522,7 @@
           </a:ln>
           <a:extLst>
             <a:ext uri="{C572A759-6A51-4108-AA02-DFA0A04FC94B}">
-              <ma14:wrappingTextBoxFlag xmlns:ma14="http://schemas.microsoft.com/office/mac/drawingml/2011/main" xmlns:a14="http://schemas.microsoft.com/office/drawing/2010/main" xmlns:m="http://schemas.openxmlformats.org/officeDocument/2006/math" xmlns="" val="1"/>
+              <ma14:wrappingTextBoxFlag xmlns="" xmlns:m="http://schemas.openxmlformats.org/officeDocument/2006/math" xmlns:a14="http://schemas.microsoft.com/office/drawing/2010/main" xmlns:ma14="http://schemas.microsoft.com/office/mac/drawingml/2011/main" val="1"/>
             </a:ext>
           </a:extLst>
         </p:spPr>
@@ -27608,7 +27640,7 @@
           </a:ln>
           <a:extLst>
             <a:ext uri="{C572A759-6A51-4108-AA02-DFA0A04FC94B}">
-              <ma14:wrappingTextBoxFlag xmlns:ma14="http://schemas.microsoft.com/office/mac/drawingml/2011/main" xmlns:a14="http://schemas.microsoft.com/office/drawing/2010/main" xmlns:m="http://schemas.openxmlformats.org/officeDocument/2006/math" xmlns="" val="1"/>
+              <ma14:wrappingTextBoxFlag xmlns="" xmlns:m="http://schemas.openxmlformats.org/officeDocument/2006/math" xmlns:a14="http://schemas.microsoft.com/office/drawing/2010/main" xmlns:ma14="http://schemas.microsoft.com/office/mac/drawingml/2011/main" val="1"/>
             </a:ext>
           </a:extLst>
         </p:spPr>
@@ -27653,7 +27685,7 @@
           </a:ln>
           <a:extLst>
             <a:ext uri="{C572A759-6A51-4108-AA02-DFA0A04FC94B}">
-              <ma14:wrappingTextBoxFlag xmlns:ma14="http://schemas.microsoft.com/office/mac/drawingml/2011/main" xmlns:a14="http://schemas.microsoft.com/office/drawing/2010/main" xmlns:m="http://schemas.openxmlformats.org/officeDocument/2006/math" xmlns="" val="1"/>
+              <ma14:wrappingTextBoxFlag xmlns="" xmlns:m="http://schemas.openxmlformats.org/officeDocument/2006/math" xmlns:a14="http://schemas.microsoft.com/office/drawing/2010/main" xmlns:ma14="http://schemas.microsoft.com/office/mac/drawingml/2011/main" val="1"/>
             </a:ext>
           </a:extLst>
         </p:spPr>
@@ -27698,7 +27730,7 @@
           </a:ln>
           <a:extLst>
             <a:ext uri="{C572A759-6A51-4108-AA02-DFA0A04FC94B}">
-              <ma14:wrappingTextBoxFlag xmlns:ma14="http://schemas.microsoft.com/office/mac/drawingml/2011/main" xmlns:a14="http://schemas.microsoft.com/office/drawing/2010/main" xmlns:m="http://schemas.openxmlformats.org/officeDocument/2006/math" xmlns="" val="1"/>
+              <ma14:wrappingTextBoxFlag xmlns="" xmlns:m="http://schemas.openxmlformats.org/officeDocument/2006/math" xmlns:a14="http://schemas.microsoft.com/office/drawing/2010/main" xmlns:ma14="http://schemas.microsoft.com/office/mac/drawingml/2011/main" val="1"/>
             </a:ext>
           </a:extLst>
         </p:spPr>
@@ -27825,7 +27857,7 @@
           </a:ln>
           <a:extLst>
             <a:ext uri="{C572A759-6A51-4108-AA02-DFA0A04FC94B}">
-              <ma14:wrappingTextBoxFlag xmlns:ma14="http://schemas.microsoft.com/office/mac/drawingml/2011/main" xmlns:a14="http://schemas.microsoft.com/office/drawing/2010/main" xmlns:m="http://schemas.openxmlformats.org/officeDocument/2006/math" xmlns="" val="1"/>
+              <ma14:wrappingTextBoxFlag xmlns="" xmlns:m="http://schemas.openxmlformats.org/officeDocument/2006/math" xmlns:a14="http://schemas.microsoft.com/office/drawing/2010/main" xmlns:ma14="http://schemas.microsoft.com/office/mac/drawingml/2011/main" val="1"/>
             </a:ext>
           </a:extLst>
         </p:spPr>
@@ -27860,7 +27892,7 @@
           </a:ln>
           <a:extLst>
             <a:ext uri="{C572A759-6A51-4108-AA02-DFA0A04FC94B}">
-              <ma14:wrappingTextBoxFlag xmlns:ma14="http://schemas.microsoft.com/office/mac/drawingml/2011/main" xmlns:a14="http://schemas.microsoft.com/office/drawing/2010/main" xmlns:m="http://schemas.openxmlformats.org/officeDocument/2006/math" xmlns="" val="1"/>
+              <ma14:wrappingTextBoxFlag xmlns="" xmlns:m="http://schemas.openxmlformats.org/officeDocument/2006/math" xmlns:a14="http://schemas.microsoft.com/office/drawing/2010/main" xmlns:ma14="http://schemas.microsoft.com/office/mac/drawingml/2011/main" val="1"/>
             </a:ext>
           </a:extLst>
         </p:spPr>
@@ -27907,7 +27939,7 @@
           </a:ln>
           <a:extLst>
             <a:ext uri="{C572A759-6A51-4108-AA02-DFA0A04FC94B}">
-              <ma14:wrappingTextBoxFlag xmlns:ma14="http://schemas.microsoft.com/office/mac/drawingml/2011/main" xmlns:a14="http://schemas.microsoft.com/office/drawing/2010/main" xmlns:m="http://schemas.openxmlformats.org/officeDocument/2006/math" xmlns="" val="1"/>
+              <ma14:wrappingTextBoxFlag xmlns="" xmlns:m="http://schemas.openxmlformats.org/officeDocument/2006/math" xmlns:a14="http://schemas.microsoft.com/office/drawing/2010/main" xmlns:ma14="http://schemas.microsoft.com/office/mac/drawingml/2011/main" val="1"/>
             </a:ext>
           </a:extLst>
         </p:spPr>
@@ -27954,7 +27986,7 @@
           </a:ln>
           <a:extLst>
             <a:ext uri="{C572A759-6A51-4108-AA02-DFA0A04FC94B}">
-              <ma14:wrappingTextBoxFlag xmlns:ma14="http://schemas.microsoft.com/office/mac/drawingml/2011/main" xmlns:a14="http://schemas.microsoft.com/office/drawing/2010/main" xmlns:m="http://schemas.openxmlformats.org/officeDocument/2006/math" xmlns="" val="1"/>
+              <ma14:wrappingTextBoxFlag xmlns="" xmlns:m="http://schemas.openxmlformats.org/officeDocument/2006/math" xmlns:a14="http://schemas.microsoft.com/office/drawing/2010/main" xmlns:ma14="http://schemas.microsoft.com/office/mac/drawingml/2011/main" val="1"/>
             </a:ext>
           </a:extLst>
         </p:spPr>
@@ -28342,7 +28374,7 @@
           </a:ln>
           <a:extLst>
             <a:ext uri="{C572A759-6A51-4108-AA02-DFA0A04FC94B}">
-              <ma14:wrappingTextBoxFlag xmlns:ma14="http://schemas.microsoft.com/office/mac/drawingml/2011/main" xmlns:a14="http://schemas.microsoft.com/office/drawing/2010/main" xmlns:m="http://schemas.openxmlformats.org/officeDocument/2006/math" xmlns="" val="1"/>
+              <ma14:wrappingTextBoxFlag xmlns="" xmlns:m="http://schemas.openxmlformats.org/officeDocument/2006/math" xmlns:a14="http://schemas.microsoft.com/office/drawing/2010/main" xmlns:ma14="http://schemas.microsoft.com/office/mac/drawingml/2011/main" val="1"/>
             </a:ext>
           </a:extLst>
         </p:spPr>
@@ -28388,7 +28420,7 @@
           </a:ln>
           <a:extLst>
             <a:ext uri="{C572A759-6A51-4108-AA02-DFA0A04FC94B}">
-              <ma14:wrappingTextBoxFlag xmlns:ma14="http://schemas.microsoft.com/office/mac/drawingml/2011/main" xmlns:a14="http://schemas.microsoft.com/office/drawing/2010/main" xmlns:m="http://schemas.openxmlformats.org/officeDocument/2006/math" xmlns="" val="1"/>
+              <ma14:wrappingTextBoxFlag xmlns="" xmlns:m="http://schemas.openxmlformats.org/officeDocument/2006/math" xmlns:a14="http://schemas.microsoft.com/office/drawing/2010/main" xmlns:ma14="http://schemas.microsoft.com/office/mac/drawingml/2011/main" val="1"/>
             </a:ext>
           </a:extLst>
         </p:spPr>
@@ -28434,7 +28466,7 @@
           </a:ln>
           <a:extLst>
             <a:ext uri="{C572A759-6A51-4108-AA02-DFA0A04FC94B}">
-              <ma14:wrappingTextBoxFlag xmlns:ma14="http://schemas.microsoft.com/office/mac/drawingml/2011/main" xmlns:a14="http://schemas.microsoft.com/office/drawing/2010/main" xmlns:m="http://schemas.openxmlformats.org/officeDocument/2006/math" xmlns="" val="1"/>
+              <ma14:wrappingTextBoxFlag xmlns="" xmlns:m="http://schemas.openxmlformats.org/officeDocument/2006/math" xmlns:a14="http://schemas.microsoft.com/office/drawing/2010/main" xmlns:ma14="http://schemas.microsoft.com/office/mac/drawingml/2011/main" val="1"/>
             </a:ext>
           </a:extLst>
         </p:spPr>
@@ -28506,7 +28538,7 @@
           </a:ln>
           <a:extLst>
             <a:ext uri="{C572A759-6A51-4108-AA02-DFA0A04FC94B}">
-              <ma14:wrappingTextBoxFlag xmlns:ma14="http://schemas.microsoft.com/office/mac/drawingml/2011/main" xmlns:a14="http://schemas.microsoft.com/office/drawing/2010/main" xmlns:m="http://schemas.openxmlformats.org/officeDocument/2006/math" xmlns="" val="1"/>
+              <ma14:wrappingTextBoxFlag xmlns="" xmlns:m="http://schemas.openxmlformats.org/officeDocument/2006/math" xmlns:a14="http://schemas.microsoft.com/office/drawing/2010/main" xmlns:ma14="http://schemas.microsoft.com/office/mac/drawingml/2011/main" val="1"/>
             </a:ext>
           </a:extLst>
         </p:spPr>
@@ -28624,7 +28656,7 @@
           </a:ln>
           <a:extLst>
             <a:ext uri="{C572A759-6A51-4108-AA02-DFA0A04FC94B}">
-              <ma14:wrappingTextBoxFlag xmlns:ma14="http://schemas.microsoft.com/office/mac/drawingml/2011/main" xmlns:a14="http://schemas.microsoft.com/office/drawing/2010/main" xmlns:m="http://schemas.openxmlformats.org/officeDocument/2006/math" xmlns="" val="1"/>
+              <ma14:wrappingTextBoxFlag xmlns="" xmlns:m="http://schemas.openxmlformats.org/officeDocument/2006/math" xmlns:a14="http://schemas.microsoft.com/office/drawing/2010/main" xmlns:ma14="http://schemas.microsoft.com/office/mac/drawingml/2011/main" val="1"/>
             </a:ext>
           </a:extLst>
         </p:spPr>
@@ -28669,7 +28701,7 @@
           </a:ln>
           <a:extLst>
             <a:ext uri="{C572A759-6A51-4108-AA02-DFA0A04FC94B}">
-              <ma14:wrappingTextBoxFlag xmlns:ma14="http://schemas.microsoft.com/office/mac/drawingml/2011/main" xmlns:a14="http://schemas.microsoft.com/office/drawing/2010/main" xmlns:m="http://schemas.openxmlformats.org/officeDocument/2006/math" xmlns="" val="1"/>
+              <ma14:wrappingTextBoxFlag xmlns="" xmlns:m="http://schemas.openxmlformats.org/officeDocument/2006/math" xmlns:a14="http://schemas.microsoft.com/office/drawing/2010/main" xmlns:ma14="http://schemas.microsoft.com/office/mac/drawingml/2011/main" val="1"/>
             </a:ext>
           </a:extLst>
         </p:spPr>
@@ -28714,7 +28746,7 @@
           </a:ln>
           <a:extLst>
             <a:ext uri="{C572A759-6A51-4108-AA02-DFA0A04FC94B}">
-              <ma14:wrappingTextBoxFlag xmlns:ma14="http://schemas.microsoft.com/office/mac/drawingml/2011/main" xmlns:a14="http://schemas.microsoft.com/office/drawing/2010/main" xmlns:m="http://schemas.openxmlformats.org/officeDocument/2006/math" xmlns="" val="1"/>
+              <ma14:wrappingTextBoxFlag xmlns="" xmlns:m="http://schemas.openxmlformats.org/officeDocument/2006/math" xmlns:a14="http://schemas.microsoft.com/office/drawing/2010/main" xmlns:ma14="http://schemas.microsoft.com/office/mac/drawingml/2011/main" val="1"/>
             </a:ext>
           </a:extLst>
         </p:spPr>

</xml_diff>